<commit_message>
Updates for final version
</commit_message>
<xml_diff>
--- a/presentations/01_python_club_intro.pptx
+++ b/presentations/01_python_club_intro.pptx
@@ -1,28 +1,29 @@
 
 <file path=ppt/presentation.xml><?xml version="1.0" encoding="utf-8"?>
-<p:presentation xmlns:a="http://schemas.openxmlformats.org/drawingml/2006/main" xmlns:r="http://schemas.openxmlformats.org/officeDocument/2006/relationships" xmlns:mc="http://schemas.openxmlformats.org/markup-compatibility/2006" xmlns:mv="urn:schemas-microsoft-com:mac:vml" xmlns:p="http://schemas.openxmlformats.org/presentationml/2006/main" mc:Ignorable="mv" mc:PreserveAttributes="mv:*" showSpecialPlsOnTitleSld="0" saveSubsetFonts="1" autoCompressPictures="0">
+<p:presentation xmlns:a="http://schemas.openxmlformats.org/drawingml/2006/main" xmlns:r="http://schemas.openxmlformats.org/officeDocument/2006/relationships" xmlns:p="http://schemas.openxmlformats.org/presentationml/2006/main" showSpecialPlsOnTitleSld="0" saveSubsetFonts="1" autoCompressPictures="0">
   <p:sldMasterIdLst>
     <p:sldMasterId id="2147483672" r:id="rId1"/>
   </p:sldMasterIdLst>
   <p:notesMasterIdLst>
-    <p:notesMasterId r:id="rId14"/>
+    <p:notesMasterId r:id="rId15"/>
   </p:notesMasterIdLst>
   <p:handoutMasterIdLst>
-    <p:handoutMasterId r:id="rId15"/>
+    <p:handoutMasterId r:id="rId16"/>
   </p:handoutMasterIdLst>
   <p:sldIdLst>
     <p:sldId id="266" r:id="rId2"/>
     <p:sldId id="256" r:id="rId3"/>
-    <p:sldId id="258" r:id="rId4"/>
-    <p:sldId id="260" r:id="rId5"/>
-    <p:sldId id="268" r:id="rId6"/>
-    <p:sldId id="261" r:id="rId7"/>
-    <p:sldId id="257" r:id="rId8"/>
-    <p:sldId id="259" r:id="rId9"/>
-    <p:sldId id="262" r:id="rId10"/>
-    <p:sldId id="263" r:id="rId11"/>
-    <p:sldId id="264" r:id="rId12"/>
-    <p:sldId id="267" r:id="rId13"/>
+    <p:sldId id="260" r:id="rId4"/>
+    <p:sldId id="261" r:id="rId5"/>
+    <p:sldId id="257" r:id="rId6"/>
+    <p:sldId id="271" r:id="rId7"/>
+    <p:sldId id="269" r:id="rId8"/>
+    <p:sldId id="270" r:id="rId9"/>
+    <p:sldId id="258" r:id="rId10"/>
+    <p:sldId id="272" r:id="rId11"/>
+    <p:sldId id="268" r:id="rId12"/>
+    <p:sldId id="264" r:id="rId13"/>
+    <p:sldId id="267" r:id="rId14"/>
   </p:sldIdLst>
   <p:sldSz cx="9144000" cy="6858000" type="screen4x3"/>
   <p:notesSz cx="6858000" cy="9144000"/>
@@ -125,7 +126,7 @@
 </file>
 
 <file path=ppt/handoutMasters/handoutMaster1.xml><?xml version="1.0" encoding="utf-8"?>
-<p:handoutMaster xmlns:a="http://schemas.openxmlformats.org/drawingml/2006/main" xmlns:r="http://schemas.openxmlformats.org/officeDocument/2006/relationships" xmlns:mc="http://schemas.openxmlformats.org/markup-compatibility/2006" xmlns:mv="urn:schemas-microsoft-com:mac:vml" xmlns:p="http://schemas.openxmlformats.org/presentationml/2006/main" mc:Ignorable="mv" mc:PreserveAttributes="mv:*">
+<p:handoutMaster xmlns:a="http://schemas.openxmlformats.org/drawingml/2006/main" xmlns:r="http://schemas.openxmlformats.org/officeDocument/2006/relationships" xmlns:p="http://schemas.openxmlformats.org/presentationml/2006/main">
   <p:cSld>
     <p:bg>
       <p:bgRef idx="1001">
@@ -207,7 +208,7 @@
             <a:fld id="{36FCBA09-6098-AE48-B888-FEBD607BA279}" type="datetimeFigureOut">
               <a:rPr lang="en-US" smtClean="0"/>
               <a:pPr/>
-              <a:t>8/14/16</a:t>
+              <a:t>8/19/16</a:t>
             </a:fld>
             <a:endParaRPr lang="en-US"/>
           </a:p>
@@ -281,6 +282,11 @@
         </p:txBody>
       </p:sp>
     </p:spTree>
+    <p:extLst>
+      <p:ext uri="{BB962C8B-B14F-4D97-AF65-F5344CB8AC3E}">
+        <p14:creationId xmlns:p14="http://schemas.microsoft.com/office/powerpoint/2010/main" val="3602338991"/>
+      </p:ext>
+    </p:extLst>
   </p:cSld>
   <p:clrMap bg1="lt1" tx1="dk1" bg2="lt2" tx2="dk2" accent1="accent1" accent2="accent2" accent3="accent3" accent4="accent4" accent5="accent5" accent6="accent6" hlink="hlink" folHlink="folHlink"/>
   <p:hf hdr="0" ftr="0" dt="0"/>
@@ -288,7 +294,7 @@
 </file>
 
 <file path=ppt/notesMasters/notesMaster1.xml><?xml version="1.0" encoding="utf-8"?>
-<p:notesMaster xmlns:a="http://schemas.openxmlformats.org/drawingml/2006/main" xmlns:r="http://schemas.openxmlformats.org/officeDocument/2006/relationships" xmlns:mc="http://schemas.openxmlformats.org/markup-compatibility/2006" xmlns:mv="urn:schemas-microsoft-com:mac:vml" xmlns:p="http://schemas.openxmlformats.org/presentationml/2006/main" mc:Ignorable="mv" mc:PreserveAttributes="mv:*">
+<p:notesMaster xmlns:a="http://schemas.openxmlformats.org/drawingml/2006/main" xmlns:r="http://schemas.openxmlformats.org/officeDocument/2006/relationships" xmlns:p="http://schemas.openxmlformats.org/presentationml/2006/main">
   <p:cSld>
     <p:bg>
       <p:bgRef idx="1001">
@@ -370,7 +376,7 @@
             <a:fld id="{4913418D-707A-9943-A112-826487BD0864}" type="datetimeFigureOut">
               <a:rPr lang="en-US" smtClean="0"/>
               <a:pPr/>
-              <a:t>8/14/16</a:t>
+              <a:t>8/19/16</a:t>
             </a:fld>
             <a:endParaRPr lang="en-US"/>
           </a:p>
@@ -539,6 +545,11 @@
         </p:txBody>
       </p:sp>
     </p:spTree>
+    <p:extLst>
+      <p:ext uri="{BB962C8B-B14F-4D97-AF65-F5344CB8AC3E}">
+        <p14:creationId xmlns:p14="http://schemas.microsoft.com/office/powerpoint/2010/main" val="2745546519"/>
+      </p:ext>
+    </p:extLst>
   </p:cSld>
   <p:clrMap bg1="lt1" tx1="dk1" bg2="lt2" tx2="dk2" accent1="accent1" accent2="accent2" accent3="accent3" accent4="accent4" accent5="accent5" accent6="accent6" hlink="hlink" folHlink="folHlink"/>
   <p:hf hdr="0" ftr="0" dt="0"/>
@@ -638,7 +649,7 @@
 </file>
 
 <file path=ppt/slideLayouts/slideLayout1.xml><?xml version="1.0" encoding="utf-8"?>
-<p:sldLayout xmlns:a="http://schemas.openxmlformats.org/drawingml/2006/main" xmlns:r="http://schemas.openxmlformats.org/officeDocument/2006/relationships" xmlns:mc="http://schemas.openxmlformats.org/markup-compatibility/2006" xmlns:mv="urn:schemas-microsoft-com:mac:vml" xmlns:p="http://schemas.openxmlformats.org/presentationml/2006/main" mc:Ignorable="mv" mc:PreserveAttributes="mv:*" showMasterSp="0" type="title" preserve="1">
+<p:sldLayout xmlns:a="http://schemas.openxmlformats.org/drawingml/2006/main" xmlns:r="http://schemas.openxmlformats.org/officeDocument/2006/relationships" xmlns:p="http://schemas.openxmlformats.org/presentationml/2006/main" showMasterSp="0" type="title" preserve="1">
   <p:cSld name="Title Slide">
     <p:spTree>
       <p:nvGrpSpPr>
@@ -781,7 +792,7 @@
             <a:fld id="{38DD805A-9F55-DD4D-8CF2-573214497E9D}" type="datetime1">
               <a:rPr lang="en-US" smtClean="0"/>
               <a:pPr/>
-              <a:t>8/14/16</a:t>
+              <a:t>8/19/16</a:t>
             </a:fld>
             <a:endParaRPr lang="en-US"/>
           </a:p>
@@ -1037,7 +1048,7 @@
 </file>
 
 <file path=ppt/slideLayouts/slideLayout10.xml><?xml version="1.0" encoding="utf-8"?>
-<p:sldLayout xmlns:a="http://schemas.openxmlformats.org/drawingml/2006/main" xmlns:r="http://schemas.openxmlformats.org/officeDocument/2006/relationships" xmlns:mc="http://schemas.openxmlformats.org/markup-compatibility/2006" xmlns:mv="urn:schemas-microsoft-com:mac:vml" xmlns:p="http://schemas.openxmlformats.org/presentationml/2006/main" mc:Ignorable="mv" mc:PreserveAttributes="mv:*" type="vertTx" preserve="1">
+<p:sldLayout xmlns:a="http://schemas.openxmlformats.org/drawingml/2006/main" xmlns:r="http://schemas.openxmlformats.org/officeDocument/2006/relationships" xmlns:p="http://schemas.openxmlformats.org/presentationml/2006/main" type="vertTx" preserve="1">
   <p:cSld name="Title and Vertical Text">
     <p:spTree>
       <p:nvGrpSpPr>
@@ -1146,7 +1157,7 @@
             <a:fld id="{BE395892-871F-2848-815D-63452D363E46}" type="datetime1">
               <a:rPr lang="en-US" smtClean="0"/>
               <a:pPr/>
-              <a:t>8/14/16</a:t>
+              <a:t>8/19/16</a:t>
             </a:fld>
             <a:endParaRPr lang="en-US"/>
           </a:p>
@@ -1208,7 +1219,7 @@
 </file>
 
 <file path=ppt/slideLayouts/slideLayout11.xml><?xml version="1.0" encoding="utf-8"?>
-<p:sldLayout xmlns:a="http://schemas.openxmlformats.org/drawingml/2006/main" xmlns:r="http://schemas.openxmlformats.org/officeDocument/2006/relationships" xmlns:mc="http://schemas.openxmlformats.org/markup-compatibility/2006" xmlns:mv="urn:schemas-microsoft-com:mac:vml" xmlns:p="http://schemas.openxmlformats.org/presentationml/2006/main" mc:Ignorable="mv" mc:PreserveAttributes="mv:*" showMasterSp="0" type="vertTitleAndTx" preserve="1">
+<p:sldLayout xmlns:a="http://schemas.openxmlformats.org/drawingml/2006/main" xmlns:r="http://schemas.openxmlformats.org/officeDocument/2006/relationships" xmlns:p="http://schemas.openxmlformats.org/presentationml/2006/main" showMasterSp="0" type="vertTitleAndTx" preserve="1">
   <p:cSld name="Vertical Title and Text">
     <p:spTree>
       <p:nvGrpSpPr>
@@ -1327,7 +1338,7 @@
             <a:fld id="{3C505B6F-1BA2-3844-A8D8-BAD9C8A9ABD1}" type="datetime1">
               <a:rPr lang="en-US" smtClean="0"/>
               <a:pPr/>
-              <a:t>8/14/16</a:t>
+              <a:t>8/19/16</a:t>
             </a:fld>
             <a:endParaRPr lang="en-US"/>
           </a:p>
@@ -1511,7 +1522,7 @@
 </file>
 
 <file path=ppt/slideLayouts/slideLayout2.xml><?xml version="1.0" encoding="utf-8"?>
-<p:sldLayout xmlns:a="http://schemas.openxmlformats.org/drawingml/2006/main" xmlns:r="http://schemas.openxmlformats.org/officeDocument/2006/relationships" xmlns:mc="http://schemas.openxmlformats.org/markup-compatibility/2006" xmlns:mv="urn:schemas-microsoft-com:mac:vml" xmlns:p="http://schemas.openxmlformats.org/presentationml/2006/main" mc:Ignorable="mv" mc:PreserveAttributes="mv:*" type="obj" preserve="1">
+<p:sldLayout xmlns:a="http://schemas.openxmlformats.org/drawingml/2006/main" xmlns:r="http://schemas.openxmlformats.org/officeDocument/2006/relationships" xmlns:p="http://schemas.openxmlformats.org/presentationml/2006/main" type="obj" preserve="1">
   <p:cSld name="Title and Content">
     <p:spTree>
       <p:nvGrpSpPr>
@@ -1568,7 +1579,7 @@
             <a:fld id="{009E1146-3B61-8846-921A-D3C074BC1EFC}" type="datetime1">
               <a:rPr lang="en-US" smtClean="0"/>
               <a:pPr/>
-              <a:t>8/14/16</a:t>
+              <a:t>8/19/16</a:t>
             </a:fld>
             <a:endParaRPr lang="en-US"/>
           </a:p>
@@ -1687,7 +1698,7 @@
 </file>
 
 <file path=ppt/slideLayouts/slideLayout3.xml><?xml version="1.0" encoding="utf-8"?>
-<p:sldLayout xmlns:a="http://schemas.openxmlformats.org/drawingml/2006/main" xmlns:r="http://schemas.openxmlformats.org/officeDocument/2006/relationships" xmlns:mc="http://schemas.openxmlformats.org/markup-compatibility/2006" xmlns:mv="urn:schemas-microsoft-com:mac:vml" xmlns:p="http://schemas.openxmlformats.org/presentationml/2006/main" mc:Ignorable="mv" mc:PreserveAttributes="mv:*" showMasterSp="0" type="secHead" preserve="1">
+<p:sldLayout xmlns:a="http://schemas.openxmlformats.org/drawingml/2006/main" xmlns:r="http://schemas.openxmlformats.org/officeDocument/2006/relationships" xmlns:p="http://schemas.openxmlformats.org/presentationml/2006/main" showMasterSp="0" type="secHead" preserve="1">
   <p:cSld name="Section Header">
     <p:bg>
       <p:bgRef idx="1001">
@@ -1843,7 +1854,7 @@
             <a:fld id="{E12671BD-2CF5-CE4C-9707-E2BAE61FAAF4}" type="datetime1">
               <a:rPr lang="en-US" smtClean="0"/>
               <a:pPr/>
-              <a:t>8/14/16</a:t>
+              <a:t>8/19/16</a:t>
             </a:fld>
             <a:endParaRPr lang="en-US"/>
           </a:p>
@@ -2007,7 +2018,7 @@
 </file>
 
 <file path=ppt/slideLayouts/slideLayout4.xml><?xml version="1.0" encoding="utf-8"?>
-<p:sldLayout xmlns:a="http://schemas.openxmlformats.org/drawingml/2006/main" xmlns:r="http://schemas.openxmlformats.org/officeDocument/2006/relationships" xmlns:mc="http://schemas.openxmlformats.org/markup-compatibility/2006" xmlns:mv="urn:schemas-microsoft-com:mac:vml" xmlns:p="http://schemas.openxmlformats.org/presentationml/2006/main" mc:Ignorable="mv" mc:PreserveAttributes="mv:*" type="twoObj" preserve="1">
+<p:sldLayout xmlns:a="http://schemas.openxmlformats.org/drawingml/2006/main" xmlns:r="http://schemas.openxmlformats.org/officeDocument/2006/relationships" xmlns:p="http://schemas.openxmlformats.org/presentationml/2006/main" type="twoObj" preserve="1">
   <p:cSld name="Two Content">
     <p:spTree>
       <p:nvGrpSpPr>
@@ -2069,7 +2080,7 @@
             <a:fld id="{473BB4FB-94C8-6842-9E2E-12CE97AB4E75}" type="datetime1">
               <a:rPr lang="en-US" smtClean="0"/>
               <a:pPr/>
-              <a:t>8/14/16</a:t>
+              <a:t>8/19/16</a:t>
             </a:fld>
             <a:endParaRPr lang="en-US"/>
           </a:p>
@@ -2245,7 +2256,7 @@
 </file>
 
 <file path=ppt/slideLayouts/slideLayout5.xml><?xml version="1.0" encoding="utf-8"?>
-<p:sldLayout xmlns:a="http://schemas.openxmlformats.org/drawingml/2006/main" xmlns:r="http://schemas.openxmlformats.org/officeDocument/2006/relationships" xmlns:mc="http://schemas.openxmlformats.org/markup-compatibility/2006" xmlns:mv="urn:schemas-microsoft-com:mac:vml" xmlns:p="http://schemas.openxmlformats.org/presentationml/2006/main" mc:Ignorable="mv" mc:PreserveAttributes="mv:*" type="twoTxTwoObj" preserve="1">
+<p:sldLayout xmlns:a="http://schemas.openxmlformats.org/drawingml/2006/main" xmlns:r="http://schemas.openxmlformats.org/officeDocument/2006/relationships" xmlns:p="http://schemas.openxmlformats.org/presentationml/2006/main" type="twoTxTwoObj" preserve="1">
   <p:cSld name="Comparison">
     <p:spTree>
       <p:nvGrpSpPr>
@@ -2427,7 +2438,7 @@
             <a:fld id="{B12B320D-7F4E-E740-BB3A-9014F9F6ABD8}" type="datetime1">
               <a:rPr lang="en-US" smtClean="0"/>
               <a:pPr/>
-              <a:t>8/14/16</a:t>
+              <a:t>8/19/16</a:t>
             </a:fld>
             <a:endParaRPr lang="en-US"/>
           </a:p>
@@ -2603,7 +2614,7 @@
 </file>
 
 <file path=ppt/slideLayouts/slideLayout6.xml><?xml version="1.0" encoding="utf-8"?>
-<p:sldLayout xmlns:a="http://schemas.openxmlformats.org/drawingml/2006/main" xmlns:r="http://schemas.openxmlformats.org/officeDocument/2006/relationships" xmlns:mc="http://schemas.openxmlformats.org/markup-compatibility/2006" xmlns:mv="urn:schemas-microsoft-com:mac:vml" xmlns:p="http://schemas.openxmlformats.org/presentationml/2006/main" mc:Ignorable="mv" mc:PreserveAttributes="mv:*" type="titleOnly" preserve="1">
+<p:sldLayout xmlns:a="http://schemas.openxmlformats.org/drawingml/2006/main" xmlns:r="http://schemas.openxmlformats.org/officeDocument/2006/relationships" xmlns:p="http://schemas.openxmlformats.org/presentationml/2006/main" type="titleOnly" preserve="1">
   <p:cSld name="Title Only">
     <p:spTree>
       <p:nvGrpSpPr>
@@ -2665,7 +2676,7 @@
             <a:fld id="{D7A6DFF2-0C98-6D4B-B682-28FA64A6D6CE}" type="datetime1">
               <a:rPr lang="en-US" smtClean="0"/>
               <a:pPr/>
-              <a:t>8/14/16</a:t>
+              <a:t>8/19/16</a:t>
             </a:fld>
             <a:endParaRPr lang="en-US"/>
           </a:p>
@@ -2777,7 +2788,7 @@
 </file>
 
 <file path=ppt/slideLayouts/slideLayout7.xml><?xml version="1.0" encoding="utf-8"?>
-<p:sldLayout xmlns:a="http://schemas.openxmlformats.org/drawingml/2006/main" xmlns:r="http://schemas.openxmlformats.org/officeDocument/2006/relationships" xmlns:mc="http://schemas.openxmlformats.org/markup-compatibility/2006" xmlns:mv="urn:schemas-microsoft-com:mac:vml" xmlns:p="http://schemas.openxmlformats.org/presentationml/2006/main" mc:Ignorable="mv" mc:PreserveAttributes="mv:*" showMasterSp="0" type="blank" preserve="1">
+<p:sldLayout xmlns:a="http://schemas.openxmlformats.org/drawingml/2006/main" xmlns:r="http://schemas.openxmlformats.org/officeDocument/2006/relationships" xmlns:p="http://schemas.openxmlformats.org/presentationml/2006/main" showMasterSp="0" type="blank" preserve="1">
   <p:cSld name="Blank">
     <p:spTree>
       <p:nvGrpSpPr>
@@ -2811,7 +2822,7 @@
             <a:fld id="{8EB06D82-88C0-DA4F-A440-7D668117E6DB}" type="datetime1">
               <a:rPr lang="en-US" smtClean="0"/>
               <a:pPr/>
-              <a:t>8/14/16</a:t>
+              <a:t>8/19/16</a:t>
             </a:fld>
             <a:endParaRPr lang="en-US"/>
           </a:p>
@@ -2959,7 +2970,7 @@
 </file>
 
 <file path=ppt/slideLayouts/slideLayout8.xml><?xml version="1.0" encoding="utf-8"?>
-<p:sldLayout xmlns:a="http://schemas.openxmlformats.org/drawingml/2006/main" xmlns:r="http://schemas.openxmlformats.org/officeDocument/2006/relationships" xmlns:mc="http://schemas.openxmlformats.org/markup-compatibility/2006" xmlns:mv="urn:schemas-microsoft-com:mac:vml" xmlns:p="http://schemas.openxmlformats.org/presentationml/2006/main" mc:Ignorable="mv" mc:PreserveAttributes="mv:*" showMasterSp="0" type="objTx" preserve="1">
+<p:sldLayout xmlns:a="http://schemas.openxmlformats.org/drawingml/2006/main" xmlns:r="http://schemas.openxmlformats.org/officeDocument/2006/relationships" xmlns:p="http://schemas.openxmlformats.org/presentationml/2006/main" showMasterSp="0" type="objTx" preserve="1">
   <p:cSld name="Content with Caption">
     <p:spTree>
       <p:nvGrpSpPr>
@@ -3094,7 +3105,7 @@
             <a:fld id="{AA82F4C9-8C65-C144-8806-A3F398B503D9}" type="datetime1">
               <a:rPr lang="en-US" smtClean="0"/>
               <a:pPr/>
-              <a:t>8/14/16</a:t>
+              <a:t>8/19/16</a:t>
             </a:fld>
             <a:endParaRPr lang="en-US"/>
           </a:p>
@@ -3335,7 +3346,7 @@
 </file>
 
 <file path=ppt/slideLayouts/slideLayout9.xml><?xml version="1.0" encoding="utf-8"?>
-<p:sldLayout xmlns:a="http://schemas.openxmlformats.org/drawingml/2006/main" xmlns:r="http://schemas.openxmlformats.org/officeDocument/2006/relationships" xmlns:mc="http://schemas.openxmlformats.org/markup-compatibility/2006" xmlns:mv="urn:schemas-microsoft-com:mac:vml" xmlns:p="http://schemas.openxmlformats.org/presentationml/2006/main" mc:Ignorable="mv" mc:PreserveAttributes="mv:*" showMasterSp="0" type="picTx" preserve="1">
+<p:sldLayout xmlns:a="http://schemas.openxmlformats.org/drawingml/2006/main" xmlns:r="http://schemas.openxmlformats.org/officeDocument/2006/relationships" xmlns:p="http://schemas.openxmlformats.org/presentationml/2006/main" showMasterSp="0" type="picTx" preserve="1">
   <p:cSld name="Picture with Caption">
     <p:bg>
       <p:bgRef idx="1001">
@@ -3507,7 +3518,7 @@
             <a:fld id="{B808DA07-A151-A64D-BEAD-0E451A28C52E}" type="datetime1">
               <a:rPr lang="en-US" smtClean="0"/>
               <a:pPr/>
-              <a:t>8/14/16</a:t>
+              <a:t>8/19/16</a:t>
             </a:fld>
             <a:endParaRPr lang="en-US"/>
           </a:p>
@@ -3701,7 +3712,7 @@
 </file>
 
 <file path=ppt/slideMasters/slideMaster1.xml><?xml version="1.0" encoding="utf-8"?>
-<p:sldMaster xmlns:a="http://schemas.openxmlformats.org/drawingml/2006/main" xmlns:r="http://schemas.openxmlformats.org/officeDocument/2006/relationships" xmlns:mc="http://schemas.openxmlformats.org/markup-compatibility/2006" xmlns:mv="urn:schemas-microsoft-com:mac:vml" xmlns:p="http://schemas.openxmlformats.org/presentationml/2006/main" mc:Ignorable="mv" mc:PreserveAttributes="mv:*">
+<p:sldMaster xmlns:a="http://schemas.openxmlformats.org/drawingml/2006/main" xmlns:r="http://schemas.openxmlformats.org/officeDocument/2006/relationships" xmlns:p="http://schemas.openxmlformats.org/presentationml/2006/main">
   <p:cSld>
     <p:bg>
       <p:bgRef idx="1001">
@@ -3851,7 +3862,7 @@
             <a:fld id="{3327B67A-D944-984B-860E-4E4E846430AB}" type="datetime1">
               <a:rPr lang="en-US" smtClean="0"/>
               <a:pPr/>
-              <a:t>8/14/16</a:t>
+              <a:t>8/19/16</a:t>
             </a:fld>
             <a:endParaRPr lang="en-US"/>
           </a:p>
@@ -4372,7 +4383,7 @@
 </file>
 
 <file path=ppt/slides/slide1.xml><?xml version="1.0" encoding="utf-8"?>
-<p:sld xmlns:a="http://schemas.openxmlformats.org/drawingml/2006/main" xmlns:r="http://schemas.openxmlformats.org/officeDocument/2006/relationships" xmlns:mc="http://schemas.openxmlformats.org/markup-compatibility/2006" xmlns:mv="urn:schemas-microsoft-com:mac:vml" xmlns:p="http://schemas.openxmlformats.org/presentationml/2006/main" mc:Ignorable="mv" mc:PreserveAttributes="mv:*">
+<p:sld xmlns:a="http://schemas.openxmlformats.org/drawingml/2006/main" xmlns:r="http://schemas.openxmlformats.org/officeDocument/2006/relationships" xmlns:p="http://schemas.openxmlformats.org/presentationml/2006/main">
   <p:cSld>
     <p:bg>
       <p:bgPr>
@@ -4437,7 +4448,7 @@
 </file>
 
 <file path=ppt/slides/slide10.xml><?xml version="1.0" encoding="utf-8"?>
-<p:sld xmlns:a="http://schemas.openxmlformats.org/drawingml/2006/main" xmlns:r="http://schemas.openxmlformats.org/officeDocument/2006/relationships" xmlns:mc="http://schemas.openxmlformats.org/markup-compatibility/2006" xmlns:mv="urn:schemas-microsoft-com:mac:vml" xmlns:p="http://schemas.openxmlformats.org/presentationml/2006/main" mc:Ignorable="mv" mc:PreserveAttributes="mv:*">
+<p:sld xmlns:a="http://schemas.openxmlformats.org/drawingml/2006/main" xmlns:r="http://schemas.openxmlformats.org/officeDocument/2006/relationships" xmlns:p="http://schemas.openxmlformats.org/presentationml/2006/main">
   <p:cSld>
     <p:spTree>
       <p:nvGrpSpPr>
@@ -4470,7 +4481,7 @@
           <a:p>
             <a:r>
               <a:rPr lang="en-US" dirty="0" smtClean="0"/>
-              <a:t>The Python Interpreter</a:t>
+              <a:t>Best Practices for Science!</a:t>
             </a:r>
             <a:endParaRPr lang="en-US" dirty="0"/>
           </a:p>
@@ -4512,10 +4523,114 @@
         </p:nvSpPr>
         <p:spPr/>
         <p:txBody>
-          <a:bodyPr/>
-          <a:lstStyle/>
-          <a:p>
-            <a:endParaRPr lang="en-US"/>
+          <a:bodyPr>
+            <a:normAutofit fontScale="92500" lnSpcReduction="20000"/>
+          </a:bodyPr>
+          <a:lstStyle/>
+          <a:p>
+            <a:r>
+              <a:rPr lang="en-US" dirty="0" smtClean="0"/>
+              <a:t>Readability</a:t>
+            </a:r>
+            <a:endParaRPr lang="en-US" dirty="0"/>
+          </a:p>
+          <a:p>
+            <a:pPr lvl="1"/>
+            <a:r>
+              <a:rPr lang="en-US" dirty="0" smtClean="0"/>
+              <a:t>Coding standards</a:t>
+            </a:r>
+          </a:p>
+          <a:p>
+            <a:pPr lvl="1"/>
+            <a:r>
+              <a:rPr lang="en-US" dirty="0" smtClean="0"/>
+              <a:t>Auto-documentation</a:t>
+            </a:r>
+          </a:p>
+          <a:p>
+            <a:pPr lvl="1"/>
+            <a:r>
+              <a:rPr lang="en-US" dirty="0" err="1" smtClean="0"/>
+              <a:t>Linting</a:t>
+            </a:r>
+            <a:endParaRPr lang="en-US" dirty="0" smtClean="0"/>
+          </a:p>
+          <a:p>
+            <a:r>
+              <a:rPr lang="en-US" dirty="0" smtClean="0"/>
+              <a:t>Maintainability</a:t>
+            </a:r>
+          </a:p>
+          <a:p>
+            <a:pPr lvl="1"/>
+            <a:r>
+              <a:rPr lang="en-US" dirty="0" smtClean="0"/>
+              <a:t>Code Versioning</a:t>
+            </a:r>
+          </a:p>
+          <a:p>
+            <a:pPr lvl="1"/>
+            <a:r>
+              <a:rPr lang="en-US" dirty="0" smtClean="0"/>
+              <a:t>Testing</a:t>
+            </a:r>
+          </a:p>
+          <a:p>
+            <a:pPr lvl="1"/>
+            <a:r>
+              <a:rPr lang="en-US" dirty="0" smtClean="0"/>
+              <a:t>Continuous Integration Techniques</a:t>
+            </a:r>
+          </a:p>
+          <a:p>
+            <a:pPr lvl="1"/>
+            <a:r>
+              <a:rPr lang="en-US" dirty="0" smtClean="0"/>
+              <a:t>Online user support with minimal effort</a:t>
+            </a:r>
+            <a:endParaRPr lang="en-US" dirty="0" smtClean="0"/>
+          </a:p>
+          <a:p>
+            <a:r>
+              <a:rPr lang="en-US" dirty="0" smtClean="0"/>
+              <a:t>Reproducibility</a:t>
+            </a:r>
+          </a:p>
+          <a:p>
+            <a:pPr lvl="1"/>
+            <a:r>
+              <a:rPr lang="en-US" dirty="0" smtClean="0"/>
+              <a:t>Open source, public code repositories</a:t>
+            </a:r>
+          </a:p>
+          <a:p>
+            <a:pPr lvl="1"/>
+            <a:r>
+              <a:rPr lang="en-US" dirty="0" err="1" smtClean="0"/>
+              <a:t>Jupyter</a:t>
+            </a:r>
+            <a:r>
+              <a:rPr lang="en-US" dirty="0" smtClean="0"/>
+              <a:t> Notebooks</a:t>
+            </a:r>
+          </a:p>
+          <a:p>
+            <a:r>
+              <a:rPr lang="en-US" dirty="0" smtClean="0"/>
+              <a:t>Collaboration</a:t>
+            </a:r>
+          </a:p>
+          <a:p>
+            <a:pPr lvl="1"/>
+            <a:r>
+              <a:rPr lang="en-US" dirty="0" smtClean="0"/>
+              <a:t>Web-based social code development</a:t>
+            </a:r>
+          </a:p>
+          <a:p>
+            <a:pPr lvl="1"/>
+            <a:endParaRPr lang="en-US" dirty="0"/>
           </a:p>
         </p:txBody>
       </p:sp>
@@ -4544,7 +4659,42 @@
           </a:prstGeom>
         </p:spPr>
       </p:pic>
+      <p:pic>
+        <p:nvPicPr>
+          <p:cNvPr id="6" name="Picture 5" descr="science-rocks_23-2147507699.jpg"/>
+          <p:cNvPicPr>
+            <a:picLocks noChangeAspect="1"/>
+          </p:cNvPicPr>
+          <p:nvPr/>
+        </p:nvPicPr>
+        <p:blipFill>
+          <a:blip r:embed="rId3">
+            <a:extLst>
+              <a:ext uri="{28A0092B-C50C-407E-A947-70E740481C1C}">
+                <a14:useLocalDpi xmlns:a14="http://schemas.microsoft.com/office/drawing/2010/main" val="0"/>
+              </a:ext>
+            </a:extLst>
+          </a:blip>
+          <a:stretch>
+            <a:fillRect/>
+          </a:stretch>
+        </p:blipFill>
+        <p:spPr>
+          <a:xfrm>
+            <a:off x="5489749" y="1242084"/>
+            <a:ext cx="3505518" cy="3505518"/>
+          </a:xfrm>
+          <a:prstGeom prst="rect">
+            <a:avLst/>
+          </a:prstGeom>
+        </p:spPr>
+      </p:pic>
     </p:spTree>
+    <p:extLst>
+      <p:ext uri="{BB962C8B-B14F-4D97-AF65-F5344CB8AC3E}">
+        <p14:creationId xmlns:p14="http://schemas.microsoft.com/office/powerpoint/2010/main" val="1562861405"/>
+      </p:ext>
+    </p:extLst>
   </p:cSld>
   <p:clrMapOvr>
     <a:masterClrMapping/>
@@ -4553,7 +4703,7 @@
 </file>
 
 <file path=ppt/slides/slide11.xml><?xml version="1.0" encoding="utf-8"?>
-<p:sld xmlns:a="http://schemas.openxmlformats.org/drawingml/2006/main" xmlns:r="http://schemas.openxmlformats.org/officeDocument/2006/relationships" xmlns:mc="http://schemas.openxmlformats.org/markup-compatibility/2006" xmlns:mv="urn:schemas-microsoft-com:mac:vml" xmlns:p="http://schemas.openxmlformats.org/presentationml/2006/main" mc:Ignorable="mv" mc:PreserveAttributes="mv:*">
+<p:sld xmlns:a="http://schemas.openxmlformats.org/drawingml/2006/main" xmlns:r="http://schemas.openxmlformats.org/officeDocument/2006/relationships" xmlns:p="http://schemas.openxmlformats.org/presentationml/2006/main">
   <p:cSld>
     <p:spTree>
       <p:nvGrpSpPr>
@@ -4586,7 +4736,7 @@
           <a:p>
             <a:r>
               <a:rPr lang="en-US" dirty="0" smtClean="0"/>
-              <a:t>Let’s Agree on an IDE</a:t>
+              <a:t>Online Courses</a:t>
             </a:r>
             <a:endParaRPr lang="en-US" dirty="0"/>
           </a:p>
@@ -4594,7 +4744,7 @@
       </p:sp>
       <p:sp>
         <p:nvSpPr>
-          <p:cNvPr id="5" name="Slide Number Placeholder 4"/>
+          <p:cNvPr id="4" name="Slide Number Placeholder 3"/>
           <p:cNvSpPr>
             <a:spLocks noGrp="1"/>
           </p:cNvSpPr>
@@ -4633,8 +4783,147 @@
           <a:p>
             <a:r>
               <a:rPr lang="en-US" dirty="0" smtClean="0"/>
-              <a:t>Integrated Development Environment</a:t>
-            </a:r>
+              <a:t>Code Academy:</a:t>
+            </a:r>
+          </a:p>
+          <a:p>
+            <a:r>
+              <a:rPr lang="en-US" dirty="0" smtClean="0">
+                <a:hlinkClick r:id="rId2"/>
+              </a:rPr>
+              <a:t>https://www.codecademy.com/learn/python</a:t>
+            </a:r>
+            <a:endParaRPr lang="en-US" dirty="0" smtClean="0"/>
+          </a:p>
+          <a:p>
+            <a:r>
+              <a:rPr lang="en-US" dirty="0" err="1" smtClean="0"/>
+              <a:t>EdX</a:t>
+            </a:r>
+            <a:r>
+              <a:rPr lang="en-US" dirty="0" smtClean="0"/>
+              <a:t> (MIT):</a:t>
+            </a:r>
+          </a:p>
+          <a:p>
+            <a:r>
+              <a:rPr lang="en-US" dirty="0" smtClean="0">
+                <a:hlinkClick r:id="rId3"/>
+              </a:rPr>
+              <a:t>https://www.edx.org/course/introduction-computer-science-mitx-6-00-1x-8#!</a:t>
+            </a:r>
+            <a:endParaRPr lang="en-US" dirty="0" smtClean="0"/>
+          </a:p>
+          <a:p>
+            <a:r>
+              <a:rPr lang="en-US" dirty="0" smtClean="0"/>
+              <a:t>Preferences?</a:t>
+            </a:r>
+          </a:p>
+          <a:p>
+            <a:pPr>
+              <a:buNone/>
+            </a:pPr>
+            <a:endParaRPr lang="en-US" dirty="0"/>
+          </a:p>
+        </p:txBody>
+      </p:sp>
+    </p:spTree>
+  </p:cSld>
+  <p:clrMapOvr>
+    <a:masterClrMapping/>
+  </p:clrMapOvr>
+</p:sld>
+</file>
+
+<file path=ppt/slides/slide12.xml><?xml version="1.0" encoding="utf-8"?>
+<p:sld xmlns:a="http://schemas.openxmlformats.org/drawingml/2006/main" xmlns:r="http://schemas.openxmlformats.org/officeDocument/2006/relationships" xmlns:p="http://schemas.openxmlformats.org/presentationml/2006/main">
+  <p:cSld>
+    <p:spTree>
+      <p:nvGrpSpPr>
+        <p:cNvPr id="1" name=""/>
+        <p:cNvGrpSpPr/>
+        <p:nvPr/>
+      </p:nvGrpSpPr>
+      <p:grpSpPr>
+        <a:xfrm>
+          <a:off x="0" y="0"/>
+          <a:ext cx="0" cy="0"/>
+          <a:chOff x="0" y="0"/>
+          <a:chExt cx="0" cy="0"/>
+        </a:xfrm>
+      </p:grpSpPr>
+      <p:sp>
+        <p:nvSpPr>
+          <p:cNvPr id="2" name="Title 1"/>
+          <p:cNvSpPr>
+            <a:spLocks noGrp="1"/>
+          </p:cNvSpPr>
+          <p:nvPr>
+            <p:ph type="title"/>
+          </p:nvPr>
+        </p:nvSpPr>
+        <p:spPr/>
+        <p:txBody>
+          <a:bodyPr/>
+          <a:lstStyle/>
+          <a:p>
+            <a:r>
+              <a:rPr lang="en-US" dirty="0" smtClean="0"/>
+              <a:t>Setting Up for Next Steps</a:t>
+            </a:r>
+            <a:endParaRPr lang="en-US" dirty="0"/>
+          </a:p>
+        </p:txBody>
+      </p:sp>
+      <p:sp>
+        <p:nvSpPr>
+          <p:cNvPr id="5" name="Slide Number Placeholder 4"/>
+          <p:cNvSpPr>
+            <a:spLocks noGrp="1"/>
+          </p:cNvSpPr>
+          <p:nvPr>
+            <p:ph type="sldNum" sz="quarter" idx="12"/>
+          </p:nvPr>
+        </p:nvSpPr>
+        <p:spPr/>
+        <p:txBody>
+          <a:bodyPr/>
+          <a:lstStyle/>
+          <a:p>
+            <a:fld id="{5F489521-D940-BC4B-A370-B4F5798663AE}" type="slidenum">
+              <a:rPr lang="en-US" smtClean="0"/>
+              <a:pPr/>
+              <a:t>12</a:t>
+            </a:fld>
+            <a:endParaRPr lang="en-US"/>
+          </a:p>
+        </p:txBody>
+      </p:sp>
+      <p:sp>
+        <p:nvSpPr>
+          <p:cNvPr id="3" name="Content Placeholder 2"/>
+          <p:cNvSpPr>
+            <a:spLocks noGrp="1"/>
+          </p:cNvSpPr>
+          <p:nvPr>
+            <p:ph sz="quarter" idx="1"/>
+          </p:nvPr>
+        </p:nvSpPr>
+        <p:spPr/>
+        <p:txBody>
+          <a:bodyPr/>
+          <a:lstStyle/>
+          <a:p>
+            <a:r>
+              <a:rPr lang="en-US" dirty="0" smtClean="0"/>
+              <a:t>Integrated Development </a:t>
+            </a:r>
+            <a:r>
+              <a:rPr lang="en-US" dirty="0" smtClean="0"/>
+              <a:t>Environment.</a:t>
+            </a:r>
+            <a:endParaRPr lang="en-US" dirty="0" smtClean="0"/>
           </a:p>
           <a:p>
             <a:pPr lvl="1"/>
@@ -4662,7 +4951,48 @@
             <a:pPr lvl="2"/>
             <a:r>
               <a:rPr lang="en-US" dirty="0" smtClean="0"/>
-              <a:t>Can get syntax highlighting and other goodies also.</a:t>
+              <a:t>Can get syntax highlighting and other goodies also</a:t>
+            </a:r>
+            <a:r>
+              <a:rPr lang="en-US" dirty="0" smtClean="0"/>
+              <a:t>.</a:t>
+            </a:r>
+          </a:p>
+          <a:p>
+            <a:pPr lvl="1"/>
+            <a:r>
+              <a:rPr lang="en-US" dirty="0" smtClean="0"/>
+              <a:t>Suggestions?</a:t>
+            </a:r>
+          </a:p>
+          <a:p>
+            <a:r>
+              <a:rPr lang="en-US" dirty="0" smtClean="0"/>
+              <a:t>Get a </a:t>
+            </a:r>
+            <a:r>
+              <a:rPr lang="en-US" dirty="0" err="1" smtClean="0"/>
+              <a:t>github</a:t>
+            </a:r>
+            <a:r>
+              <a:rPr lang="en-US" dirty="0" smtClean="0"/>
+              <a:t> account.</a:t>
+            </a:r>
+          </a:p>
+          <a:p>
+            <a:r>
+              <a:rPr lang="en-US" dirty="0" smtClean="0"/>
+              <a:t>Account on instruction platform</a:t>
+            </a:r>
+          </a:p>
+          <a:p>
+            <a:r>
+              <a:rPr lang="en-US" dirty="0"/>
+              <a:t>S</a:t>
+            </a:r>
+            <a:r>
+              <a:rPr lang="en-US" dirty="0" smtClean="0"/>
+              <a:t>lack channel</a:t>
             </a:r>
             <a:endParaRPr lang="en-US" dirty="0"/>
           </a:p>
@@ -4701,8 +5031,8 @@
 </p:sld>
 </file>
 
-<file path=ppt/slides/slide12.xml><?xml version="1.0" encoding="utf-8"?>
-<p:sld xmlns:a="http://schemas.openxmlformats.org/drawingml/2006/main" xmlns:r="http://schemas.openxmlformats.org/officeDocument/2006/relationships" xmlns:mc="http://schemas.openxmlformats.org/markup-compatibility/2006" xmlns:mv="urn:schemas-microsoft-com:mac:vml" xmlns:p="http://schemas.openxmlformats.org/presentationml/2006/main" mc:Ignorable="mv" mc:PreserveAttributes="mv:*">
+<file path=ppt/slides/slide13.xml><?xml version="1.0" encoding="utf-8"?>
+<p:sld xmlns:a="http://schemas.openxmlformats.org/drawingml/2006/main" xmlns:r="http://schemas.openxmlformats.org/officeDocument/2006/relationships" xmlns:p="http://schemas.openxmlformats.org/presentationml/2006/main">
   <p:cSld>
     <p:bg>
       <p:bgPr>
@@ -4766,7 +5096,7 @@
   <p:timing>
     <p:tnLst>
       <p:par>
-        <p:cTn id="1" dur="indefinite" restart="never" nodeType="tmRoot"/>
+        <p:cTn xmlns:p14="http://schemas.microsoft.com/office/powerpoint/2010/main" id="1" dur="indefinite" restart="never" nodeType="tmRoot"/>
       </p:par>
     </p:tnLst>
   </p:timing>
@@ -4774,7 +5104,7 @@
 </file>
 
 <file path=ppt/slides/slide2.xml><?xml version="1.0" encoding="utf-8"?>
-<p:sld xmlns:a="http://schemas.openxmlformats.org/drawingml/2006/main" xmlns:r="http://schemas.openxmlformats.org/officeDocument/2006/relationships" xmlns:mc="http://schemas.openxmlformats.org/markup-compatibility/2006" xmlns:mv="urn:schemas-microsoft-com:mac:vml" xmlns:p="http://schemas.openxmlformats.org/presentationml/2006/main" mc:Ignorable="mv" mc:PreserveAttributes="mv:*">
+<p:sld xmlns:a="http://schemas.openxmlformats.org/drawingml/2006/main" xmlns:r="http://schemas.openxmlformats.org/officeDocument/2006/relationships" xmlns:p="http://schemas.openxmlformats.org/presentationml/2006/main">
   <p:cSld>
     <p:spTree>
       <p:nvGrpSpPr>
@@ -4873,7 +5203,7 @@
 </file>
 
 <file path=ppt/slides/slide3.xml><?xml version="1.0" encoding="utf-8"?>
-<p:sld xmlns:a="http://schemas.openxmlformats.org/drawingml/2006/main" xmlns:r="http://schemas.openxmlformats.org/officeDocument/2006/relationships" xmlns:mc="http://schemas.openxmlformats.org/markup-compatibility/2006" xmlns:mv="urn:schemas-microsoft-com:mac:vml" xmlns:p="http://schemas.openxmlformats.org/presentationml/2006/main" mc:Ignorable="mv" mc:PreserveAttributes="mv:*">
+<p:sld xmlns:a="http://schemas.openxmlformats.org/drawingml/2006/main" xmlns:r="http://schemas.openxmlformats.org/officeDocument/2006/relationships" xmlns:p="http://schemas.openxmlformats.org/presentationml/2006/main">
   <p:cSld>
     <p:spTree>
       <p:nvGrpSpPr>
@@ -4906,7 +5236,7 @@
           <a:p>
             <a:r>
               <a:rPr lang="en-US" dirty="0" smtClean="0"/>
-              <a:t>Goals of the Club</a:t>
+              <a:t>Club Organization</a:t>
             </a:r>
             <a:endParaRPr lang="en-US" dirty="0"/>
           </a:p>
@@ -4955,82 +5285,324 @@
           <a:p>
             <a:r>
               <a:rPr lang="en-US" dirty="0" smtClean="0"/>
-              <a:t>Initially focusing on syntax and procedural language.</a:t>
+              <a:t>Meet once a week</a:t>
+            </a:r>
+          </a:p>
+          <a:p>
+            <a:r>
+              <a:rPr lang="en-US" dirty="0" smtClean="0"/>
+              <a:t>Organizer: </a:t>
+            </a:r>
+            <a:r>
+              <a:rPr lang="en-US" sz="2400" dirty="0" err="1" smtClean="0"/>
+              <a:t>Asma</a:t>
+            </a:r>
+            <a:r>
+              <a:rPr lang="en-US" sz="2400" dirty="0" smtClean="0"/>
+              <a:t> </a:t>
+            </a:r>
+            <a:r>
+              <a:rPr lang="en-US" sz="2400" dirty="0" err="1" smtClean="0"/>
+              <a:t>Bankapur</a:t>
+            </a:r>
+            <a:r>
+              <a:rPr lang="en-US" sz="2400" dirty="0" smtClean="0"/>
+              <a:t> (</a:t>
+            </a:r>
+            <a:r>
+              <a:rPr lang="en-US" sz="2400" dirty="0" smtClean="0">
+                <a:hlinkClick r:id="rId2"/>
+              </a:rPr>
+              <a:t>bankapur@broadinstitute.org</a:t>
+            </a:r>
+            <a:r>
+              <a:rPr lang="en-US" sz="2400" dirty="0" smtClean="0"/>
+              <a:t>)</a:t>
+            </a:r>
+          </a:p>
+          <a:p>
+            <a:r>
+              <a:rPr lang="en-US" dirty="0" smtClean="0"/>
+              <a:t>Instructors: </a:t>
+            </a:r>
+            <a:r>
+              <a:rPr lang="en-US" sz="2400" dirty="0" smtClean="0"/>
+              <a:t>Timothy Tickle (</a:t>
+            </a:r>
+            <a:r>
+              <a:rPr lang="en-US" sz="2400" dirty="0" smtClean="0">
+                <a:hlinkClick r:id="rId3"/>
+              </a:rPr>
+              <a:t>ttickle@broadinstitute.org</a:t>
+            </a:r>
+            <a:r>
+              <a:rPr lang="en-US" sz="2400" dirty="0" smtClean="0"/>
+              <a:t>)</a:t>
             </a:r>
           </a:p>
           <a:p>
             <a:pPr lvl="1"/>
             <a:r>
               <a:rPr lang="en-US" dirty="0" smtClean="0"/>
-              <a:t>Milestone to make a tested script that can be called from command line.</a:t>
-            </a:r>
-          </a:p>
-          <a:p>
-            <a:r>
-              <a:rPr lang="en-US" dirty="0" smtClean="0"/>
-              <a:t>Object Oriented Language Elements</a:t>
+              <a:t>and YOU?!</a:t>
+            </a:r>
+          </a:p>
+          <a:p>
+            <a:r>
+              <a:rPr lang="en-US" dirty="0" smtClean="0"/>
+              <a:t>Join the </a:t>
+            </a:r>
+            <a:r>
+              <a:rPr lang="en-US" dirty="0" err="1" smtClean="0"/>
+              <a:t>coding_club</a:t>
+            </a:r>
+            <a:r>
+              <a:rPr lang="en-US" dirty="0" smtClean="0"/>
+              <a:t> slack channel.</a:t>
+            </a:r>
+          </a:p>
+          <a:p>
+            <a:r>
+              <a:rPr lang="en-US" dirty="0" err="1" smtClean="0"/>
+              <a:t>Github</a:t>
+            </a:r>
+            <a:r>
+              <a:rPr lang="en-US" dirty="0" smtClean="0"/>
+              <a:t> repo for materials</a:t>
             </a:r>
           </a:p>
           <a:p>
             <a:pPr lvl="1"/>
             <a:r>
-              <a:rPr lang="en-US" dirty="0" smtClean="0"/>
-              <a:t>Create a website with </a:t>
+              <a:rPr lang="en-US" dirty="0" smtClean="0">
+                <a:hlinkClick r:id="rId4"/>
+              </a:rPr>
+              <a:t>https://github.com/TimothyTickle/python_club</a:t>
+            </a:r>
+            <a:endParaRPr lang="en-US" dirty="0" smtClean="0"/>
+          </a:p>
+          <a:p>
+            <a:r>
+              <a:rPr lang="en-US" dirty="0" smtClean="0"/>
+              <a:t>https://</a:t>
             </a:r>
             <a:r>
               <a:rPr lang="en-US" dirty="0" err="1" smtClean="0"/>
-              <a:t>Django</a:t>
-            </a:r>
-            <a:r>
-              <a:rPr lang="en-US" dirty="0" smtClean="0"/>
-              <a:t> Flask?</a:t>
-            </a:r>
+              <a:t>www.codecademy.com</a:t>
+            </a:r>
+            <a:r>
+              <a:rPr lang="en-US" dirty="0" smtClean="0"/>
+              <a:t>/learn/python</a:t>
+            </a:r>
+          </a:p>
+          <a:p>
+            <a:r>
+              <a:rPr lang="en-US" dirty="0" smtClean="0"/>
+              <a:t>https://</a:t>
+            </a:r>
+            <a:r>
+              <a:rPr lang="en-US" dirty="0" err="1" smtClean="0"/>
+              <a:t>www.python.org</a:t>
+            </a:r>
+            <a:endParaRPr lang="en-US" dirty="0" smtClean="0"/>
+          </a:p>
+        </p:txBody>
+      </p:sp>
+      <p:pic>
+        <p:nvPicPr>
+          <p:cNvPr id="4" name="Picture 3" descr="Python_logo_and_wordmark.svg.png"/>
+          <p:cNvPicPr>
+            <a:picLocks noChangeAspect="1"/>
+          </p:cNvPicPr>
+          <p:nvPr/>
+        </p:nvPicPr>
+        <p:blipFill>
+          <a:blip r:embed="rId5"/>
+          <a:srcRect r="72000"/>
+          <a:stretch>
+            <a:fillRect/>
+          </a:stretch>
+        </p:blipFill>
+        <p:spPr>
+          <a:xfrm>
+            <a:off x="250664" y="5747360"/>
+            <a:ext cx="924575" cy="977900"/>
+          </a:xfrm>
+          <a:prstGeom prst="rect">
+            <a:avLst/>
+          </a:prstGeom>
+        </p:spPr>
+      </p:pic>
+    </p:spTree>
+  </p:cSld>
+  <p:clrMapOvr>
+    <a:masterClrMapping/>
+  </p:clrMapOvr>
+</p:sld>
+</file>
+
+<file path=ppt/slides/slide4.xml><?xml version="1.0" encoding="utf-8"?>
+<p:sld xmlns:a="http://schemas.openxmlformats.org/drawingml/2006/main" xmlns:r="http://schemas.openxmlformats.org/officeDocument/2006/relationships" xmlns:p="http://schemas.openxmlformats.org/presentationml/2006/main">
+  <p:cSld>
+    <p:spTree>
+      <p:nvGrpSpPr>
+        <p:cNvPr id="1" name=""/>
+        <p:cNvGrpSpPr/>
+        <p:nvPr/>
+      </p:nvGrpSpPr>
+      <p:grpSpPr>
+        <a:xfrm>
+          <a:off x="0" y="0"/>
+          <a:ext cx="0" cy="0"/>
+          <a:chOff x="0" y="0"/>
+          <a:chExt cx="0" cy="0"/>
+        </a:xfrm>
+      </p:grpSpPr>
+      <p:sp>
+        <p:nvSpPr>
+          <p:cNvPr id="2" name="Title 1"/>
+          <p:cNvSpPr>
+            <a:spLocks noGrp="1"/>
+          </p:cNvSpPr>
+          <p:nvPr>
+            <p:ph type="title"/>
+          </p:nvPr>
+        </p:nvSpPr>
+        <p:spPr/>
+        <p:txBody>
+          <a:bodyPr/>
+          <a:lstStyle/>
+          <a:p>
+            <a:r>
+              <a:rPr lang="en-US" dirty="0" smtClean="0"/>
+              <a:t>Instructor Background</a:t>
+            </a:r>
+            <a:endParaRPr lang="en-US" dirty="0"/>
+          </a:p>
+        </p:txBody>
+      </p:sp>
+      <p:sp>
+        <p:nvSpPr>
+          <p:cNvPr id="6" name="Slide Number Placeholder 5"/>
+          <p:cNvSpPr>
+            <a:spLocks noGrp="1"/>
+          </p:cNvSpPr>
+          <p:nvPr>
+            <p:ph type="sldNum" sz="quarter" idx="12"/>
+          </p:nvPr>
+        </p:nvSpPr>
+        <p:spPr/>
+        <p:txBody>
+          <a:bodyPr/>
+          <a:lstStyle/>
+          <a:p>
+            <a:fld id="{5F489521-D940-BC4B-A370-B4F5798663AE}" type="slidenum">
+              <a:rPr lang="en-US" smtClean="0"/>
+              <a:pPr/>
+              <a:t>4</a:t>
+            </a:fld>
+            <a:endParaRPr lang="en-US"/>
+          </a:p>
+        </p:txBody>
+      </p:sp>
+      <p:sp>
+        <p:nvSpPr>
+          <p:cNvPr id="3" name="Content Placeholder 2"/>
+          <p:cNvSpPr>
+            <a:spLocks noGrp="1"/>
+          </p:cNvSpPr>
+          <p:nvPr>
+            <p:ph sz="quarter" idx="1"/>
+          </p:nvPr>
+        </p:nvSpPr>
+        <p:spPr>
+          <a:xfrm>
+            <a:off x="457200" y="1600200"/>
+            <a:ext cx="6511725" cy="4525963"/>
+          </a:xfrm>
+        </p:spPr>
+        <p:txBody>
+          <a:bodyPr>
+            <a:normAutofit/>
+          </a:bodyPr>
+          <a:lstStyle/>
+          <a:p>
+            <a:r>
+              <a:rPr lang="en-US" sz="2400" dirty="0" smtClean="0"/>
+              <a:t>Senior Software Engineer  in the </a:t>
+            </a:r>
+            <a:r>
+              <a:rPr lang="en-US" sz="2400" dirty="0" err="1" smtClean="0"/>
+              <a:t>Regev</a:t>
+            </a:r>
+            <a:r>
+              <a:rPr lang="en-US" sz="2400" dirty="0" smtClean="0"/>
+              <a:t> and KCO.</a:t>
+            </a:r>
+          </a:p>
+          <a:p>
+            <a:r>
+              <a:rPr lang="en-US" sz="2400" dirty="0" smtClean="0"/>
+              <a:t>Steering Committee Member of Broad </a:t>
+            </a:r>
+            <a:r>
+              <a:rPr lang="en-US" sz="2400" dirty="0" err="1" smtClean="0"/>
+              <a:t>SoftEng</a:t>
+            </a:r>
+            <a:r>
+              <a:rPr lang="en-US" sz="2400" dirty="0" smtClean="0"/>
+              <a:t>.</a:t>
+            </a:r>
+          </a:p>
+          <a:p>
+            <a:r>
+              <a:rPr lang="en-US" sz="2400" dirty="0" smtClean="0"/>
+              <a:t>BS in Computer Science, PhD in Bioinformatics and Computational Biology, </a:t>
+            </a:r>
+            <a:r>
+              <a:rPr lang="en-US" sz="2400" dirty="0" err="1" smtClean="0"/>
+              <a:t>PostDoc</a:t>
+            </a:r>
+            <a:r>
+              <a:rPr lang="en-US" sz="2400" dirty="0" smtClean="0"/>
+              <a:t> working with Inference in </a:t>
+            </a:r>
+            <a:r>
+              <a:rPr lang="en-US" sz="2400" dirty="0" err="1" smtClean="0"/>
+              <a:t>Metagenomics</a:t>
+            </a:r>
+            <a:r>
+              <a:rPr lang="en-US" sz="2400" dirty="0" smtClean="0"/>
+              <a:t> Studies</a:t>
+            </a:r>
+          </a:p>
+          <a:p>
+            <a:r>
+              <a:rPr lang="en-US" sz="2400" dirty="0" smtClean="0"/>
+              <a:t>16 years of experience in programming </a:t>
+            </a:r>
+            <a:br>
+              <a:rPr lang="en-US" sz="2400" dirty="0" smtClean="0"/>
+            </a:br>
+            <a:r>
+              <a:rPr lang="en-US" sz="2400" dirty="0" smtClean="0"/>
+              <a:t>focused on: C/C++/C#, Java, Perl, Python, R</a:t>
+            </a:r>
+          </a:p>
+          <a:p>
+            <a:r>
+              <a:rPr lang="en-US" sz="2400" dirty="0" smtClean="0"/>
+              <a:t>This is not a tyranny!</a:t>
+            </a:r>
+            <a:endParaRPr lang="en-US" sz="2400" dirty="0" smtClean="0"/>
           </a:p>
           <a:p>
             <a:pPr lvl="1"/>
             <a:r>
-              <a:rPr lang="en-US" dirty="0" err="1" smtClean="0"/>
-              <a:t>Trinotate</a:t>
-            </a:r>
-            <a:r>
-              <a:rPr lang="en-US" dirty="0" smtClean="0"/>
-              <a:t> Web?</a:t>
-            </a:r>
-          </a:p>
-          <a:p>
-            <a:r>
-              <a:rPr lang="en-US" dirty="0" smtClean="0"/>
-              <a:t>Functional Programming</a:t>
-            </a:r>
-          </a:p>
-          <a:p>
-            <a:pPr lvl="1"/>
-            <a:r>
-              <a:rPr lang="en-US" dirty="0" smtClean="0"/>
-              <a:t>Milestone?</a:t>
-            </a:r>
-          </a:p>
-          <a:p>
-            <a:r>
-              <a:rPr lang="en-US" dirty="0" smtClean="0"/>
-              <a:t>Data Science</a:t>
-            </a:r>
-          </a:p>
-          <a:p>
-            <a:pPr lvl="1"/>
-            <a:r>
-              <a:rPr lang="en-US" dirty="0" smtClean="0"/>
-              <a:t>Milestone? </a:t>
-            </a:r>
-            <a:r>
-              <a:rPr lang="en-US" dirty="0" err="1" smtClean="0"/>
-              <a:t>iPython</a:t>
-            </a:r>
-            <a:r>
-              <a:rPr lang="en-US" dirty="0" smtClean="0"/>
-              <a:t> Notebook</a:t>
-            </a:r>
-            <a:endParaRPr lang="en-US" dirty="0"/>
+              <a:rPr lang="en-US" sz="2000" dirty="0" smtClean="0"/>
+              <a:t>A conversation, not a dictatorship.</a:t>
+            </a:r>
+            <a:endParaRPr lang="en-US" sz="2000" dirty="0"/>
           </a:p>
         </p:txBody>
       </p:sp>
@@ -5059,6 +5631,30 @@
           </a:prstGeom>
         </p:spPr>
       </p:pic>
+      <p:pic>
+        <p:nvPicPr>
+          <p:cNvPr id="5" name="Picture 4" descr="qeyLs.png"/>
+          <p:cNvPicPr>
+            <a:picLocks noChangeAspect="1"/>
+          </p:cNvPicPr>
+          <p:nvPr/>
+        </p:nvPicPr>
+        <p:blipFill>
+          <a:blip r:embed="rId3"/>
+          <a:stretch>
+            <a:fillRect/>
+          </a:stretch>
+        </p:blipFill>
+        <p:spPr>
+          <a:xfrm>
+            <a:off x="6547379" y="1754086"/>
+            <a:ext cx="2280536" cy="4372077"/>
+          </a:xfrm>
+          <a:prstGeom prst="rect">
+            <a:avLst/>
+          </a:prstGeom>
+        </p:spPr>
+      </p:pic>
     </p:spTree>
   </p:cSld>
   <p:clrMapOvr>
@@ -5067,8 +5663,8 @@
 </p:sld>
 </file>
 
-<file path=ppt/slides/slide4.xml><?xml version="1.0" encoding="utf-8"?>
-<p:sld xmlns:a="http://schemas.openxmlformats.org/drawingml/2006/main" xmlns:r="http://schemas.openxmlformats.org/officeDocument/2006/relationships" xmlns:mc="http://schemas.openxmlformats.org/markup-compatibility/2006" xmlns:mv="urn:schemas-microsoft-com:mac:vml" xmlns:p="http://schemas.openxmlformats.org/presentationml/2006/main" mc:Ignorable="mv" mc:PreserveAttributes="mv:*">
+<file path=ppt/slides/slide5.xml><?xml version="1.0" encoding="utf-8"?>
+<p:sld xmlns:a="http://schemas.openxmlformats.org/drawingml/2006/main" xmlns:r="http://schemas.openxmlformats.org/officeDocument/2006/relationships" xmlns:p="http://schemas.openxmlformats.org/presentationml/2006/main">
   <p:cSld>
     <p:spTree>
       <p:nvGrpSpPr>
@@ -5101,7 +5697,7 @@
           <a:p>
             <a:r>
               <a:rPr lang="en-US" dirty="0" smtClean="0"/>
-              <a:t>Club Organization</a:t>
+              <a:t>Why Python?</a:t>
             </a:r>
             <a:endParaRPr lang="en-US" dirty="0"/>
           </a:p>
@@ -5110,245 +5706,6 @@
       <p:sp>
         <p:nvSpPr>
           <p:cNvPr id="5" name="Slide Number Placeholder 4"/>
-          <p:cNvSpPr>
-            <a:spLocks noGrp="1"/>
-          </p:cNvSpPr>
-          <p:nvPr>
-            <p:ph type="sldNum" sz="quarter" idx="12"/>
-          </p:nvPr>
-        </p:nvSpPr>
-        <p:spPr/>
-        <p:txBody>
-          <a:bodyPr/>
-          <a:lstStyle/>
-          <a:p>
-            <a:fld id="{5F489521-D940-BC4B-A370-B4F5798663AE}" type="slidenum">
-              <a:rPr lang="en-US" smtClean="0"/>
-              <a:pPr/>
-              <a:t>4</a:t>
-            </a:fld>
-            <a:endParaRPr lang="en-US"/>
-          </a:p>
-        </p:txBody>
-      </p:sp>
-      <p:sp>
-        <p:nvSpPr>
-          <p:cNvPr id="3" name="Content Placeholder 2"/>
-          <p:cNvSpPr>
-            <a:spLocks noGrp="1"/>
-          </p:cNvSpPr>
-          <p:nvPr>
-            <p:ph sz="quarter" idx="1"/>
-          </p:nvPr>
-        </p:nvSpPr>
-        <p:spPr/>
-        <p:txBody>
-          <a:bodyPr>
-            <a:normAutofit/>
-          </a:bodyPr>
-          <a:lstStyle/>
-          <a:p>
-            <a:r>
-              <a:rPr lang="en-US" dirty="0" smtClean="0"/>
-              <a:t>Meet once a week</a:t>
-            </a:r>
-          </a:p>
-          <a:p>
-            <a:r>
-              <a:rPr lang="en-US" dirty="0" smtClean="0"/>
-              <a:t>Organizer: </a:t>
-            </a:r>
-            <a:r>
-              <a:rPr lang="en-US" sz="2400" dirty="0" err="1" smtClean="0"/>
-              <a:t>Asma</a:t>
-            </a:r>
-            <a:r>
-              <a:rPr lang="en-US" sz="2400" dirty="0" smtClean="0"/>
-              <a:t> </a:t>
-            </a:r>
-            <a:r>
-              <a:rPr lang="en-US" sz="2400" dirty="0" err="1" smtClean="0"/>
-              <a:t>Bankapur</a:t>
-            </a:r>
-            <a:r>
-              <a:rPr lang="en-US" sz="2400" dirty="0" smtClean="0"/>
-              <a:t> (</a:t>
-            </a:r>
-            <a:r>
-              <a:rPr lang="en-US" sz="2400" dirty="0" smtClean="0">
-                <a:hlinkClick r:id="rId2"/>
-              </a:rPr>
-              <a:t>bankapur@broadinstitute.org</a:t>
-            </a:r>
-            <a:r>
-              <a:rPr lang="en-US" sz="2400" dirty="0" smtClean="0"/>
-              <a:t>)</a:t>
-            </a:r>
-          </a:p>
-          <a:p>
-            <a:r>
-              <a:rPr lang="en-US" dirty="0" smtClean="0"/>
-              <a:t>Instructors: </a:t>
-            </a:r>
-            <a:r>
-              <a:rPr lang="en-US" sz="2400" dirty="0" smtClean="0"/>
-              <a:t>Timothy Tickle (</a:t>
-            </a:r>
-            <a:r>
-              <a:rPr lang="en-US" sz="2400" dirty="0" smtClean="0">
-                <a:hlinkClick r:id="rId3"/>
-              </a:rPr>
-              <a:t>ttickle@broadinstitute.org</a:t>
-            </a:r>
-            <a:r>
-              <a:rPr lang="en-US" sz="2400" dirty="0" smtClean="0"/>
-              <a:t>)</a:t>
-            </a:r>
-          </a:p>
-          <a:p>
-            <a:pPr lvl="1"/>
-            <a:r>
-              <a:rPr lang="en-US" dirty="0" smtClean="0"/>
-              <a:t>and YOU?!</a:t>
-            </a:r>
-          </a:p>
-          <a:p>
-            <a:r>
-              <a:rPr lang="en-US" dirty="0" smtClean="0"/>
-              <a:t>Join the </a:t>
-            </a:r>
-            <a:r>
-              <a:rPr lang="en-US" dirty="0" err="1" smtClean="0"/>
-              <a:t>coding_club</a:t>
-            </a:r>
-            <a:r>
-              <a:rPr lang="en-US" dirty="0" smtClean="0"/>
-              <a:t> slack channel.</a:t>
-            </a:r>
-          </a:p>
-          <a:p>
-            <a:r>
-              <a:rPr lang="en-US" dirty="0" err="1" smtClean="0"/>
-              <a:t>Github</a:t>
-            </a:r>
-            <a:r>
-              <a:rPr lang="en-US" dirty="0" smtClean="0"/>
-              <a:t> repo for materials</a:t>
-            </a:r>
-          </a:p>
-          <a:p>
-            <a:pPr lvl="1"/>
-            <a:r>
-              <a:rPr lang="en-US" dirty="0" smtClean="0">
-                <a:hlinkClick r:id="rId4"/>
-              </a:rPr>
-              <a:t>https://github.com/TimothyTickle/python_club</a:t>
-            </a:r>
-            <a:endParaRPr lang="en-US" dirty="0" smtClean="0"/>
-          </a:p>
-          <a:p>
-            <a:r>
-              <a:rPr lang="en-US" dirty="0" smtClean="0"/>
-              <a:t>https://</a:t>
-            </a:r>
-            <a:r>
-              <a:rPr lang="en-US" dirty="0" err="1" smtClean="0"/>
-              <a:t>www.codecademy.com</a:t>
-            </a:r>
-            <a:r>
-              <a:rPr lang="en-US" dirty="0" smtClean="0"/>
-              <a:t>/learn/python</a:t>
-            </a:r>
-          </a:p>
-          <a:p>
-            <a:r>
-              <a:rPr lang="en-US" dirty="0" smtClean="0"/>
-              <a:t>https://</a:t>
-            </a:r>
-            <a:r>
-              <a:rPr lang="en-US" dirty="0" err="1" smtClean="0"/>
-              <a:t>www.python.org</a:t>
-            </a:r>
-            <a:endParaRPr lang="en-US" dirty="0" smtClean="0"/>
-          </a:p>
-        </p:txBody>
-      </p:sp>
-      <p:pic>
-        <p:nvPicPr>
-          <p:cNvPr id="4" name="Picture 3" descr="Python_logo_and_wordmark.svg.png"/>
-          <p:cNvPicPr>
-            <a:picLocks noChangeAspect="1"/>
-          </p:cNvPicPr>
-          <p:nvPr/>
-        </p:nvPicPr>
-        <p:blipFill>
-          <a:blip r:embed="rId5"/>
-          <a:srcRect r="72000"/>
-          <a:stretch>
-            <a:fillRect/>
-          </a:stretch>
-        </p:blipFill>
-        <p:spPr>
-          <a:xfrm>
-            <a:off x="250664" y="5747360"/>
-            <a:ext cx="924575" cy="977900"/>
-          </a:xfrm>
-          <a:prstGeom prst="rect">
-            <a:avLst/>
-          </a:prstGeom>
-        </p:spPr>
-      </p:pic>
-    </p:spTree>
-  </p:cSld>
-  <p:clrMapOvr>
-    <a:masterClrMapping/>
-  </p:clrMapOvr>
-</p:sld>
-</file>
-
-<file path=ppt/slides/slide5.xml><?xml version="1.0" encoding="utf-8"?>
-<p:sld xmlns:a="http://schemas.openxmlformats.org/drawingml/2006/main" xmlns:r="http://schemas.openxmlformats.org/officeDocument/2006/relationships" xmlns:mc="http://schemas.openxmlformats.org/markup-compatibility/2006" xmlns:mv="urn:schemas-microsoft-com:mac:vml" xmlns:p="http://schemas.openxmlformats.org/presentationml/2006/main" mc:Ignorable="mv" mc:PreserveAttributes="mv:*">
-  <p:cSld>
-    <p:spTree>
-      <p:nvGrpSpPr>
-        <p:cNvPr id="1" name=""/>
-        <p:cNvGrpSpPr/>
-        <p:nvPr/>
-      </p:nvGrpSpPr>
-      <p:grpSpPr>
-        <a:xfrm>
-          <a:off x="0" y="0"/>
-          <a:ext cx="0" cy="0"/>
-          <a:chOff x="0" y="0"/>
-          <a:chExt cx="0" cy="0"/>
-        </a:xfrm>
-      </p:grpSpPr>
-      <p:sp>
-        <p:nvSpPr>
-          <p:cNvPr id="2" name="Title 1"/>
-          <p:cNvSpPr>
-            <a:spLocks noGrp="1"/>
-          </p:cNvSpPr>
-          <p:nvPr>
-            <p:ph type="title"/>
-          </p:nvPr>
-        </p:nvSpPr>
-        <p:spPr/>
-        <p:txBody>
-          <a:bodyPr/>
-          <a:lstStyle/>
-          <a:p>
-            <a:r>
-              <a:rPr lang="en-US" dirty="0" smtClean="0"/>
-              <a:t>Online Courses</a:t>
-            </a:r>
-            <a:endParaRPr lang="en-US" dirty="0"/>
-          </a:p>
-        </p:txBody>
-      </p:sp>
-      <p:sp>
-        <p:nvSpPr>
-          <p:cNvPr id="4" name="Slide Number Placeholder 3"/>
           <p:cNvSpPr>
             <a:spLocks noGrp="1"/>
           </p:cNvSpPr>
@@ -5382,225 +5739,88 @@
         </p:nvSpPr>
         <p:spPr/>
         <p:txBody>
-          <a:bodyPr/>
-          <a:lstStyle/>
-          <a:p>
-            <a:r>
-              <a:rPr lang="en-US" dirty="0" smtClean="0"/>
-              <a:t>Code Academy:</a:t>
-            </a:r>
-          </a:p>
-          <a:p>
-            <a:r>
-              <a:rPr lang="en-US" dirty="0" smtClean="0">
-                <a:hlinkClick r:id="rId2"/>
-              </a:rPr>
-              <a:t>https://www.codecademy.com/learn/python</a:t>
+          <a:bodyPr>
+            <a:normAutofit fontScale="92500"/>
+          </a:bodyPr>
+          <a:lstStyle/>
+          <a:p>
+            <a:r>
+              <a:rPr lang="en-US" dirty="0" smtClean="0"/>
+              <a:t>Python is NOT a perfect language…there are none.</a:t>
+            </a:r>
+          </a:p>
+          <a:p>
+            <a:pPr lvl="1"/>
+            <a:r>
+              <a:rPr lang="en-US" dirty="0" smtClean="0"/>
+              <a:t>So why Python?</a:t>
+            </a:r>
+          </a:p>
+          <a:p>
+            <a:r>
+              <a:rPr lang="en-US" dirty="0" smtClean="0"/>
+              <a:t>Perl?</a:t>
+            </a:r>
+          </a:p>
+          <a:p>
+            <a:pPr lvl="1"/>
+            <a:r>
+              <a:rPr lang="en-US" dirty="0" smtClean="0"/>
+              <a:t>Both come out of Unix based systems scripting focused on text files.</a:t>
+            </a:r>
+          </a:p>
+          <a:p>
+            <a:pPr lvl="1"/>
+            <a:r>
+              <a:rPr lang="en-US" dirty="0" smtClean="0"/>
+              <a:t>In this context Perl is faster and more succinct.</a:t>
+            </a:r>
+          </a:p>
+          <a:p>
+            <a:pPr lvl="1"/>
+            <a:r>
+              <a:rPr lang="en-US" dirty="0" smtClean="0"/>
+              <a:t>Perl is not as readable and is becoming less embraced in the community.</a:t>
             </a:r>
             <a:endParaRPr lang="en-US" dirty="0" smtClean="0"/>
           </a:p>
           <a:p>
             <a:r>
-              <a:rPr lang="en-US" dirty="0" err="1" smtClean="0"/>
-              <a:t>EdX</a:t>
-            </a:r>
-            <a:r>
-              <a:rPr lang="en-US" dirty="0" smtClean="0"/>
-              <a:t> (MIT):</a:t>
-            </a:r>
-          </a:p>
-          <a:p>
-            <a:r>
-              <a:rPr lang="en-US" dirty="0" smtClean="0">
-                <a:hlinkClick r:id="rId3"/>
-              </a:rPr>
-              <a:t>https://www.edx.org/course/introduction-computer-science-mitx-6-00-1x-8#!</a:t>
-            </a:r>
-            <a:endParaRPr lang="en-US" dirty="0" smtClean="0"/>
-          </a:p>
-          <a:p>
-            <a:r>
-              <a:rPr lang="en-US" dirty="0" smtClean="0"/>
-              <a:t>Preferences?</a:t>
-            </a:r>
-          </a:p>
-          <a:p>
-            <a:pPr>
-              <a:buNone/>
-            </a:pPr>
-            <a:endParaRPr lang="en-US" dirty="0"/>
-          </a:p>
-        </p:txBody>
-      </p:sp>
-    </p:spTree>
-  </p:cSld>
-  <p:clrMapOvr>
-    <a:masterClrMapping/>
-  </p:clrMapOvr>
-</p:sld>
-</file>
-
-<file path=ppt/slides/slide6.xml><?xml version="1.0" encoding="utf-8"?>
-<p:sld xmlns:a="http://schemas.openxmlformats.org/drawingml/2006/main" xmlns:r="http://schemas.openxmlformats.org/officeDocument/2006/relationships" xmlns:mc="http://schemas.openxmlformats.org/markup-compatibility/2006" xmlns:mv="urn:schemas-microsoft-com:mac:vml" xmlns:p="http://schemas.openxmlformats.org/presentationml/2006/main" mc:Ignorable="mv" mc:PreserveAttributes="mv:*">
-  <p:cSld>
-    <p:spTree>
-      <p:nvGrpSpPr>
-        <p:cNvPr id="1" name=""/>
-        <p:cNvGrpSpPr/>
-        <p:nvPr/>
-      </p:nvGrpSpPr>
-      <p:grpSpPr>
-        <a:xfrm>
-          <a:off x="0" y="0"/>
-          <a:ext cx="0" cy="0"/>
-          <a:chOff x="0" y="0"/>
-          <a:chExt cx="0" cy="0"/>
-        </a:xfrm>
-      </p:grpSpPr>
-      <p:sp>
-        <p:nvSpPr>
-          <p:cNvPr id="2" name="Title 1"/>
-          <p:cNvSpPr>
-            <a:spLocks noGrp="1"/>
-          </p:cNvSpPr>
-          <p:nvPr>
-            <p:ph type="title"/>
-          </p:nvPr>
-        </p:nvSpPr>
-        <p:spPr/>
-        <p:txBody>
-          <a:bodyPr/>
-          <a:lstStyle/>
-          <a:p>
-            <a:r>
-              <a:rPr lang="en-US" dirty="0" smtClean="0"/>
-              <a:t>Instructor Background</a:t>
-            </a:r>
-            <a:endParaRPr lang="en-US" dirty="0"/>
-          </a:p>
-        </p:txBody>
-      </p:sp>
-      <p:sp>
-        <p:nvSpPr>
-          <p:cNvPr id="6" name="Slide Number Placeholder 5"/>
-          <p:cNvSpPr>
-            <a:spLocks noGrp="1"/>
-          </p:cNvSpPr>
-          <p:nvPr>
-            <p:ph type="sldNum" sz="quarter" idx="12"/>
-          </p:nvPr>
-        </p:nvSpPr>
-        <p:spPr/>
-        <p:txBody>
-          <a:bodyPr/>
-          <a:lstStyle/>
-          <a:p>
-            <a:fld id="{5F489521-D940-BC4B-A370-B4F5798663AE}" type="slidenum">
-              <a:rPr lang="en-US" smtClean="0"/>
-              <a:pPr/>
-              <a:t>6</a:t>
-            </a:fld>
-            <a:endParaRPr lang="en-US"/>
-          </a:p>
-        </p:txBody>
-      </p:sp>
-      <p:sp>
-        <p:nvSpPr>
-          <p:cNvPr id="3" name="Content Placeholder 2"/>
-          <p:cNvSpPr>
-            <a:spLocks noGrp="1"/>
-          </p:cNvSpPr>
-          <p:nvPr>
-            <p:ph sz="quarter" idx="1"/>
-          </p:nvPr>
-        </p:nvSpPr>
-        <p:spPr>
-          <a:xfrm>
-            <a:off x="457200" y="1600200"/>
-            <a:ext cx="6511725" cy="4525963"/>
-          </a:xfrm>
-        </p:spPr>
-        <p:txBody>
-          <a:bodyPr>
-            <a:normAutofit/>
-          </a:bodyPr>
-          <a:lstStyle/>
-          <a:p>
-            <a:r>
-              <a:rPr lang="en-US" sz="2400" dirty="0" smtClean="0"/>
-              <a:t>Senior Software Engineer  in the </a:t>
-            </a:r>
-            <a:r>
-              <a:rPr lang="en-US" sz="2400" dirty="0" err="1" smtClean="0"/>
-              <a:t>Regev</a:t>
-            </a:r>
-            <a:r>
-              <a:rPr lang="en-US" sz="2400" dirty="0" smtClean="0"/>
-              <a:t> and KCO.</a:t>
-            </a:r>
-          </a:p>
-          <a:p>
-            <a:r>
-              <a:rPr lang="en-US" sz="2400" dirty="0" smtClean="0"/>
-              <a:t>Steering Committee Member of Broad </a:t>
-            </a:r>
-            <a:r>
-              <a:rPr lang="en-US" sz="2400" dirty="0" err="1" smtClean="0"/>
-              <a:t>SoftEng</a:t>
-            </a:r>
-            <a:r>
-              <a:rPr lang="en-US" sz="2400" dirty="0" smtClean="0"/>
-              <a:t>.</a:t>
-            </a:r>
-          </a:p>
-          <a:p>
-            <a:r>
-              <a:rPr lang="en-US" sz="2400" dirty="0" smtClean="0"/>
-              <a:t>BS in Computer Science, PhD in Bioinformatics and Computational Biology, </a:t>
-            </a:r>
-            <a:r>
-              <a:rPr lang="en-US" sz="2400" dirty="0" err="1" smtClean="0"/>
-              <a:t>PostDoc</a:t>
-            </a:r>
-            <a:r>
-              <a:rPr lang="en-US" sz="2400" dirty="0" smtClean="0"/>
-              <a:t> working with Inference in </a:t>
-            </a:r>
-            <a:r>
-              <a:rPr lang="en-US" sz="2400" dirty="0" err="1" smtClean="0"/>
-              <a:t>Metagenomics</a:t>
-            </a:r>
-            <a:r>
-              <a:rPr lang="en-US" sz="2400" dirty="0" smtClean="0"/>
-              <a:t> Studies</a:t>
-            </a:r>
-          </a:p>
-          <a:p>
-            <a:r>
-              <a:rPr lang="en-US" sz="2400" dirty="0" smtClean="0"/>
-              <a:t>16 years of experience in programming </a:t>
-            </a:r>
-            <a:br>
-              <a:rPr lang="en-US" sz="2400" dirty="0" smtClean="0"/>
-            </a:br>
-            <a:r>
-              <a:rPr lang="en-US" sz="2400" dirty="0" smtClean="0"/>
-              <a:t>focused on: C/C++/C#, Java, Perl, Python, R</a:t>
-            </a:r>
-          </a:p>
-          <a:p>
-            <a:r>
-              <a:rPr lang="en-US" sz="2400" dirty="0" smtClean="0"/>
-              <a:t>I do NOT want to the authority.</a:t>
+              <a:rPr lang="en-US" dirty="0"/>
+              <a:t>C</a:t>
+            </a:r>
+            <a:r>
+              <a:rPr lang="en-US" dirty="0" smtClean="0"/>
+              <a:t>/C++?</a:t>
             </a:r>
           </a:p>
           <a:p>
             <a:pPr lvl="1"/>
             <a:r>
-              <a:rPr lang="en-US" sz="2000" dirty="0" smtClean="0"/>
-              <a:t>A conversation, not a dictatorship.</a:t>
-            </a:r>
-            <a:endParaRPr lang="en-US" sz="2000" dirty="0"/>
+              <a:rPr lang="en-US" dirty="0" smtClean="0"/>
+              <a:t>Fast.</a:t>
+            </a:r>
+          </a:p>
+          <a:p>
+            <a:pPr lvl="1"/>
+            <a:r>
+              <a:rPr lang="en-US" dirty="0" smtClean="0"/>
+              <a:t>Efficient.</a:t>
+            </a:r>
+          </a:p>
+          <a:p>
+            <a:pPr lvl="1"/>
+            <a:r>
+              <a:rPr lang="en-US" dirty="0" smtClean="0"/>
+              <a:t>Large Learning Curve.</a:t>
+            </a:r>
+          </a:p>
+          <a:p>
+            <a:pPr lvl="1"/>
+            <a:r>
+              <a:rPr lang="en-US" dirty="0" smtClean="0"/>
+              <a:t>I love these languages but the devil is in the details.</a:t>
+            </a:r>
           </a:p>
         </p:txBody>
       </p:sp>
@@ -5629,30 +5849,6 @@
           </a:prstGeom>
         </p:spPr>
       </p:pic>
-      <p:pic>
-        <p:nvPicPr>
-          <p:cNvPr id="5" name="Picture 4" descr="qeyLs.png"/>
-          <p:cNvPicPr>
-            <a:picLocks noChangeAspect="1"/>
-          </p:cNvPicPr>
-          <p:nvPr/>
-        </p:nvPicPr>
-        <p:blipFill>
-          <a:blip r:embed="rId3"/>
-          <a:stretch>
-            <a:fillRect/>
-          </a:stretch>
-        </p:blipFill>
-        <p:spPr>
-          <a:xfrm>
-            <a:off x="6547379" y="1754086"/>
-            <a:ext cx="2280536" cy="4372077"/>
-          </a:xfrm>
-          <a:prstGeom prst="rect">
-            <a:avLst/>
-          </a:prstGeom>
-        </p:spPr>
-      </p:pic>
     </p:spTree>
   </p:cSld>
   <p:clrMapOvr>
@@ -5661,8 +5857,8 @@
 </p:sld>
 </file>
 
-<file path=ppt/slides/slide7.xml><?xml version="1.0" encoding="utf-8"?>
-<p:sld xmlns:a="http://schemas.openxmlformats.org/drawingml/2006/main" xmlns:r="http://schemas.openxmlformats.org/officeDocument/2006/relationships" xmlns:mc="http://schemas.openxmlformats.org/markup-compatibility/2006" xmlns:mv="urn:schemas-microsoft-com:mac:vml" xmlns:p="http://schemas.openxmlformats.org/presentationml/2006/main" mc:Ignorable="mv" mc:PreserveAttributes="mv:*">
+<file path=ppt/slides/slide6.xml><?xml version="1.0" encoding="utf-8"?>
+<p:sld xmlns:a="http://schemas.openxmlformats.org/drawingml/2006/main" xmlns:r="http://schemas.openxmlformats.org/officeDocument/2006/relationships" xmlns:p="http://schemas.openxmlformats.org/presentationml/2006/main">
   <p:cSld>
     <p:spTree>
       <p:nvGrpSpPr>
@@ -5719,7 +5915,7 @@
             <a:fld id="{5F489521-D940-BC4B-A370-B4F5798663AE}" type="slidenum">
               <a:rPr lang="en-US" smtClean="0"/>
               <a:pPr/>
-              <a:t>7</a:t>
+              <a:t>6</a:t>
             </a:fld>
             <a:endParaRPr lang="en-US"/>
           </a:p>
@@ -5737,10 +5933,100 @@
         </p:nvSpPr>
         <p:spPr/>
         <p:txBody>
-          <a:bodyPr/>
-          <a:lstStyle/>
-          <a:p>
-            <a:endParaRPr lang="en-US"/>
+          <a:bodyPr>
+            <a:normAutofit fontScale="92500" lnSpcReduction="10000"/>
+          </a:bodyPr>
+          <a:lstStyle/>
+          <a:p>
+            <a:r>
+              <a:rPr lang="en-US" dirty="0" smtClean="0"/>
+              <a:t>Java?</a:t>
+            </a:r>
+          </a:p>
+          <a:p>
+            <a:pPr lvl="1"/>
+            <a:r>
+              <a:rPr lang="en-US" dirty="0" smtClean="0"/>
+              <a:t>May be slightly faster than Python. </a:t>
+            </a:r>
+          </a:p>
+          <a:p>
+            <a:pPr lvl="1"/>
+            <a:r>
+              <a:rPr lang="en-US" dirty="0" smtClean="0"/>
+              <a:t>Verbose.</a:t>
+            </a:r>
+          </a:p>
+          <a:p>
+            <a:pPr lvl="1"/>
+            <a:r>
+              <a:rPr lang="en-US" dirty="0" smtClean="0"/>
+              <a:t>Complicated object hierarchies (design can fix this).</a:t>
+            </a:r>
+          </a:p>
+          <a:p>
+            <a:r>
+              <a:rPr lang="en-US" dirty="0" smtClean="0"/>
+              <a:t>R?</a:t>
+            </a:r>
+          </a:p>
+          <a:p>
+            <a:pPr lvl="1"/>
+            <a:r>
+              <a:rPr lang="en-US" dirty="0" smtClean="0"/>
+              <a:t>Awesome for math / data science (but this is it’s only niche).</a:t>
+            </a:r>
+          </a:p>
+          <a:p>
+            <a:r>
+              <a:rPr lang="en-US" dirty="0" err="1" smtClean="0"/>
+              <a:t>Matlab</a:t>
+            </a:r>
+            <a:r>
+              <a:rPr lang="en-US" dirty="0" smtClean="0"/>
+              <a:t>?</a:t>
+            </a:r>
+          </a:p>
+          <a:p>
+            <a:pPr lvl="1"/>
+            <a:r>
+              <a:rPr lang="en-US" dirty="0" smtClean="0"/>
+              <a:t>Not open source solution.</a:t>
+            </a:r>
+          </a:p>
+          <a:p>
+            <a:r>
+              <a:rPr lang="en-US" dirty="0" smtClean="0"/>
+              <a:t>Python?</a:t>
+            </a:r>
+          </a:p>
+          <a:p>
+            <a:pPr lvl="1"/>
+            <a:r>
+              <a:rPr lang="en-US" dirty="0" smtClean="0"/>
+              <a:t>Weaknesses</a:t>
+            </a:r>
+          </a:p>
+          <a:p>
+            <a:pPr lvl="2"/>
+            <a:r>
+              <a:rPr lang="en-US" dirty="0" smtClean="0"/>
+              <a:t>R is better at math</a:t>
+            </a:r>
+          </a:p>
+          <a:p>
+            <a:pPr lvl="2"/>
+            <a:r>
+              <a:rPr lang="en-US" dirty="0" smtClean="0"/>
+              <a:t>No Mobile</a:t>
+            </a:r>
+          </a:p>
+          <a:p>
+            <a:pPr lvl="2"/>
+            <a:r>
+              <a:rPr lang="en-US" dirty="0" smtClean="0"/>
+              <a:t>JS is a better web platform</a:t>
+            </a:r>
           </a:p>
         </p:txBody>
       </p:sp>
@@ -5769,7 +6055,42 @@
           </a:prstGeom>
         </p:spPr>
       </p:pic>
+      <p:pic>
+        <p:nvPicPr>
+          <p:cNvPr id="6" name="Picture 5" descr="python_2.jpeg"/>
+          <p:cNvPicPr>
+            <a:picLocks noChangeAspect="1"/>
+          </p:cNvPicPr>
+          <p:nvPr/>
+        </p:nvPicPr>
+        <p:blipFill>
+          <a:blip r:embed="rId3">
+            <a:extLst>
+              <a:ext uri="{28A0092B-C50C-407E-A947-70E740481C1C}">
+                <a14:useLocalDpi xmlns:a14="http://schemas.microsoft.com/office/drawing/2010/main" val="0"/>
+              </a:ext>
+            </a:extLst>
+          </a:blip>
+          <a:stretch>
+            <a:fillRect/>
+          </a:stretch>
+        </p:blipFill>
+        <p:spPr>
+          <a:xfrm>
+            <a:off x="4509738" y="3610377"/>
+            <a:ext cx="4459793" cy="2931613"/>
+          </a:xfrm>
+          <a:prstGeom prst="rect">
+            <a:avLst/>
+          </a:prstGeom>
+        </p:spPr>
+      </p:pic>
     </p:spTree>
+    <p:extLst>
+      <p:ext uri="{BB962C8B-B14F-4D97-AF65-F5344CB8AC3E}">
+        <p14:creationId xmlns:p14="http://schemas.microsoft.com/office/powerpoint/2010/main" val="1239176671"/>
+      </p:ext>
+    </p:extLst>
   </p:cSld>
   <p:clrMapOvr>
     <a:masterClrMapping/>
@@ -5777,8 +6098,8 @@
 </p:sld>
 </file>
 
-<file path=ppt/slides/slide8.xml><?xml version="1.0" encoding="utf-8"?>
-<p:sld xmlns:a="http://schemas.openxmlformats.org/drawingml/2006/main" xmlns:r="http://schemas.openxmlformats.org/officeDocument/2006/relationships" xmlns:mc="http://schemas.openxmlformats.org/markup-compatibility/2006" xmlns:mv="urn:schemas-microsoft-com:mac:vml" xmlns:p="http://schemas.openxmlformats.org/presentationml/2006/main" mc:Ignorable="mv" mc:PreserveAttributes="mv:*">
+<file path=ppt/slides/slide7.xml><?xml version="1.0" encoding="utf-8"?>
+<p:sld xmlns:a="http://schemas.openxmlformats.org/drawingml/2006/main" xmlns:r="http://schemas.openxmlformats.org/officeDocument/2006/relationships" xmlns:p="http://schemas.openxmlformats.org/presentationml/2006/main">
   <p:cSld>
     <p:spTree>
       <p:nvGrpSpPr>
@@ -5811,7 +6132,7 @@
           <a:p>
             <a:r>
               <a:rPr lang="en-US" dirty="0" smtClean="0"/>
-              <a:t>The History of Python</a:t>
+              <a:t>Why Python?</a:t>
             </a:r>
             <a:endParaRPr lang="en-US" dirty="0"/>
           </a:p>
@@ -5835,7 +6156,7 @@
             <a:fld id="{5F489521-D940-BC4B-A370-B4F5798663AE}" type="slidenum">
               <a:rPr lang="en-US" smtClean="0"/>
               <a:pPr/>
-              <a:t>8</a:t>
+              <a:t>7</a:t>
             </a:fld>
             <a:endParaRPr lang="en-US"/>
           </a:p>
@@ -5853,10 +6174,94 @@
         </p:nvSpPr>
         <p:spPr/>
         <p:txBody>
-          <a:bodyPr/>
-          <a:lstStyle/>
-          <a:p>
-            <a:endParaRPr lang="en-US"/>
+          <a:bodyPr>
+            <a:normAutofit fontScale="92500"/>
+          </a:bodyPr>
+          <a:lstStyle/>
+          <a:p>
+            <a:r>
+              <a:rPr lang="en-US" dirty="0" smtClean="0"/>
+              <a:t>Python is readable</a:t>
+            </a:r>
+          </a:p>
+          <a:p>
+            <a:pPr lvl="1"/>
+            <a:r>
+              <a:rPr lang="en-US" dirty="0" smtClean="0"/>
+              <a:t>Popular in science for this reason</a:t>
+            </a:r>
+          </a:p>
+          <a:p>
+            <a:pPr lvl="1"/>
+            <a:r>
+              <a:rPr lang="en-US" dirty="0" smtClean="0"/>
+              <a:t>You can still be a scientist!</a:t>
+            </a:r>
+          </a:p>
+          <a:p>
+            <a:pPr lvl="1"/>
+            <a:r>
+              <a:rPr lang="en-US" dirty="0" smtClean="0"/>
+              <a:t>Maintainable</a:t>
+            </a:r>
+          </a:p>
+          <a:p>
+            <a:pPr lvl="1"/>
+            <a:r>
+              <a:rPr lang="en-US" dirty="0" smtClean="0"/>
+              <a:t>Nice first language.</a:t>
+            </a:r>
+          </a:p>
+          <a:p>
+            <a:r>
+              <a:rPr lang="en-US" dirty="0" smtClean="0"/>
+              <a:t>Scientific Libraries are written by scientists.</a:t>
+            </a:r>
+          </a:p>
+          <a:p>
+            <a:r>
+              <a:rPr lang="en-US" dirty="0" smtClean="0"/>
+              <a:t>Has collected a large library.</a:t>
+            </a:r>
+          </a:p>
+          <a:p>
+            <a:r>
+              <a:rPr lang="en-US" dirty="0" smtClean="0"/>
+              <a:t>Python can make blazing fast solutions with C++.</a:t>
+            </a:r>
+          </a:p>
+          <a:p>
+            <a:pPr lvl="1"/>
+            <a:r>
+              <a:rPr lang="en-US" dirty="0"/>
+              <a:t>Most the things you will write will not require blazing </a:t>
+            </a:r>
+            <a:r>
+              <a:rPr lang="en-US" dirty="0" smtClean="0"/>
+              <a:t>speeds.</a:t>
+            </a:r>
+          </a:p>
+          <a:p>
+            <a:pPr lvl="1"/>
+            <a:r>
+              <a:rPr lang="en-US" dirty="0" smtClean="0"/>
+              <a:t>A lot of work has gone into and continues to go into Python’s speed.</a:t>
+            </a:r>
+          </a:p>
+          <a:p>
+            <a:pPr lvl="1"/>
+            <a:r>
+              <a:rPr lang="en-US" dirty="0" smtClean="0"/>
+              <a:t>This does not mean it is fast but it can be with C/C++.</a:t>
+            </a:r>
+            <a:endParaRPr lang="en-US" dirty="0"/>
+          </a:p>
+          <a:p>
+            <a:pPr lvl="1"/>
+            <a:r>
+              <a:rPr lang="en-US" dirty="0" smtClean="0"/>
+              <a:t>As a first language this is not really the point…</a:t>
+            </a:r>
           </a:p>
         </p:txBody>
       </p:sp>
@@ -5885,7 +6290,42 @@
           </a:prstGeom>
         </p:spPr>
       </p:pic>
+      <p:pic>
+        <p:nvPicPr>
+          <p:cNvPr id="6" name="Picture 5" descr="python_vs_1.jpeg"/>
+          <p:cNvPicPr>
+            <a:picLocks noChangeAspect="1"/>
+          </p:cNvPicPr>
+          <p:nvPr/>
+        </p:nvPicPr>
+        <p:blipFill>
+          <a:blip r:embed="rId3">
+            <a:extLst>
+              <a:ext uri="{28A0092B-C50C-407E-A947-70E740481C1C}">
+                <a14:useLocalDpi xmlns:a14="http://schemas.microsoft.com/office/drawing/2010/main" val="0"/>
+              </a:ext>
+            </a:extLst>
+          </a:blip>
+          <a:stretch>
+            <a:fillRect/>
+          </a:stretch>
+        </p:blipFill>
+        <p:spPr>
+          <a:xfrm>
+            <a:off x="4965785" y="217396"/>
+            <a:ext cx="3959180" cy="3066288"/>
+          </a:xfrm>
+          <a:prstGeom prst="rect">
+            <a:avLst/>
+          </a:prstGeom>
+        </p:spPr>
+      </p:pic>
     </p:spTree>
+    <p:extLst>
+      <p:ext uri="{BB962C8B-B14F-4D97-AF65-F5344CB8AC3E}">
+        <p14:creationId xmlns:p14="http://schemas.microsoft.com/office/powerpoint/2010/main" val="4041758011"/>
+      </p:ext>
+    </p:extLst>
   </p:cSld>
   <p:clrMapOvr>
     <a:masterClrMapping/>
@@ -5893,8 +6333,8 @@
 </p:sld>
 </file>
 
-<file path=ppt/slides/slide9.xml><?xml version="1.0" encoding="utf-8"?>
-<p:sld xmlns:a="http://schemas.openxmlformats.org/drawingml/2006/main" xmlns:r="http://schemas.openxmlformats.org/officeDocument/2006/relationships" xmlns:mc="http://schemas.openxmlformats.org/markup-compatibility/2006" xmlns:mv="urn:schemas-microsoft-com:mac:vml" xmlns:p="http://schemas.openxmlformats.org/presentationml/2006/main" mc:Ignorable="mv" mc:PreserveAttributes="mv:*">
+<file path=ppt/slides/slide8.xml><?xml version="1.0" encoding="utf-8"?>
+<p:sld xmlns:a="http://schemas.openxmlformats.org/drawingml/2006/main" xmlns:r="http://schemas.openxmlformats.org/officeDocument/2006/relationships" xmlns:p="http://schemas.openxmlformats.org/presentationml/2006/main">
   <p:cSld>
     <p:spTree>
       <p:nvGrpSpPr>
@@ -5927,15 +6367,235 @@
           <a:p>
             <a:r>
               <a:rPr lang="en-US" dirty="0" smtClean="0"/>
-              <a:t>Python 2.x </a:t>
-            </a:r>
+              <a:t>Who Uses Python?</a:t>
+            </a:r>
+            <a:endParaRPr lang="en-US" dirty="0"/>
+          </a:p>
+        </p:txBody>
+      </p:sp>
+      <p:sp>
+        <p:nvSpPr>
+          <p:cNvPr id="3" name="Slide Number Placeholder 2"/>
+          <p:cNvSpPr>
+            <a:spLocks noGrp="1"/>
+          </p:cNvSpPr>
+          <p:nvPr>
+            <p:ph type="sldNum" sz="quarter" idx="12"/>
+          </p:nvPr>
+        </p:nvSpPr>
+        <p:spPr/>
+        <p:txBody>
+          <a:bodyPr/>
+          <a:lstStyle/>
+          <a:p>
+            <a:fld id="{5F489521-D940-BC4B-A370-B4F5798663AE}" type="slidenum">
+              <a:rPr lang="en-US" smtClean="0"/>
+              <a:pPr/>
+              <a:t>8</a:t>
+            </a:fld>
+            <a:endParaRPr lang="en-US"/>
+          </a:p>
+        </p:txBody>
+      </p:sp>
+      <p:sp>
+        <p:nvSpPr>
+          <p:cNvPr id="4" name="Content Placeholder 3"/>
+          <p:cNvSpPr>
+            <a:spLocks noGrp="1"/>
+          </p:cNvSpPr>
+          <p:nvPr>
+            <p:ph sz="quarter" idx="1"/>
+          </p:nvPr>
+        </p:nvSpPr>
+        <p:spPr/>
+        <p:txBody>
+          <a:bodyPr>
+            <a:normAutofit fontScale="77500" lnSpcReduction="20000"/>
+          </a:bodyPr>
+          <a:lstStyle/>
+          <a:p>
+            <a:r>
+              <a:rPr lang="en-US" dirty="0" smtClean="0"/>
+              <a:t>Google</a:t>
+            </a:r>
+          </a:p>
+          <a:p>
+            <a:pPr lvl="1"/>
             <a:r>
               <a:rPr lang="en-US" dirty="0" err="1" smtClean="0"/>
-              <a:t>vs</a:t>
-            </a:r>
-            <a:r>
-              <a:rPr lang="en-US" dirty="0" smtClean="0"/>
-              <a:t> 3.x</a:t>
+              <a:t>Compments</a:t>
+            </a:r>
+            <a:r>
+              <a:rPr lang="en-US" dirty="0" smtClean="0"/>
+              <a:t> of spider / search engines</a:t>
+            </a:r>
+          </a:p>
+          <a:p>
+            <a:r>
+              <a:rPr lang="en-US" dirty="0" err="1" smtClean="0"/>
+              <a:t>RedHat</a:t>
+            </a:r>
+            <a:endParaRPr lang="en-US" dirty="0" smtClean="0"/>
+          </a:p>
+          <a:p>
+            <a:pPr lvl="1"/>
+            <a:r>
+              <a:rPr lang="en-US" dirty="0" smtClean="0"/>
+              <a:t>Uses it for their installer / configuration utilities (Anaconda)</a:t>
+            </a:r>
+          </a:p>
+          <a:p>
+            <a:r>
+              <a:rPr lang="en-US" dirty="0" smtClean="0"/>
+              <a:t>IBM</a:t>
+            </a:r>
+          </a:p>
+          <a:p>
+            <a:pPr lvl="1"/>
+            <a:r>
+              <a:rPr lang="en-US" dirty="0" smtClean="0"/>
+              <a:t>Factory Tool Control Automation</a:t>
+            </a:r>
+          </a:p>
+          <a:p>
+            <a:r>
+              <a:rPr lang="en-US" dirty="0" smtClean="0"/>
+              <a:t>Disney!</a:t>
+            </a:r>
+          </a:p>
+          <a:p>
+            <a:pPr lvl="1"/>
+            <a:r>
+              <a:rPr lang="en-US" dirty="0" smtClean="0"/>
+              <a:t>Animation production scripts.</a:t>
+            </a:r>
+          </a:p>
+          <a:p>
+            <a:r>
+              <a:rPr lang="en-US" dirty="0" smtClean="0"/>
+              <a:t>Industrial Light and Magic</a:t>
+            </a:r>
+          </a:p>
+          <a:p>
+            <a:pPr lvl="1"/>
+            <a:r>
+              <a:rPr lang="en-US" dirty="0" smtClean="0"/>
+              <a:t>Scripts used in making The Mummy, The Phantom Menace.</a:t>
+            </a:r>
+          </a:p>
+          <a:p>
+            <a:r>
+              <a:rPr lang="en-US" dirty="0" smtClean="0"/>
+              <a:t>Eve-online</a:t>
+            </a:r>
+          </a:p>
+          <a:p>
+            <a:pPr lvl="1"/>
+            <a:r>
+              <a:rPr lang="en-US" dirty="0" smtClean="0"/>
+              <a:t>Massively Multiplayer Online RPG (MMORPG).</a:t>
+            </a:r>
+          </a:p>
+          <a:p>
+            <a:r>
+              <a:rPr lang="en-US" dirty="0" smtClean="0"/>
+              <a:t>NASA</a:t>
+            </a:r>
+          </a:p>
+          <a:p>
+            <a:pPr lvl="1"/>
+            <a:r>
+              <a:rPr lang="en-US" dirty="0" smtClean="0"/>
+              <a:t>The standard for Johnson Space Center (being adopted in Mission Control).</a:t>
+            </a:r>
+          </a:p>
+          <a:p>
+            <a:r>
+              <a:rPr lang="en-US" dirty="0" smtClean="0"/>
+              <a:t>The Broad Institute!</a:t>
+            </a:r>
+            <a:endParaRPr lang="en-US" dirty="0"/>
+          </a:p>
+        </p:txBody>
+      </p:sp>
+      <p:pic>
+        <p:nvPicPr>
+          <p:cNvPr id="5" name="Picture 4" descr="Mickey-mouse-image-hd-disney.jpg"/>
+          <p:cNvPicPr>
+            <a:picLocks noChangeAspect="1"/>
+          </p:cNvPicPr>
+          <p:nvPr/>
+        </p:nvPicPr>
+        <p:blipFill>
+          <a:blip r:embed="rId2">
+            <a:extLst>
+              <a:ext uri="{28A0092B-C50C-407E-A947-70E740481C1C}">
+                <a14:useLocalDpi xmlns:a14="http://schemas.microsoft.com/office/drawing/2010/main" val="0"/>
+              </a:ext>
+            </a:extLst>
+          </a:blip>
+          <a:stretch>
+            <a:fillRect/>
+          </a:stretch>
+        </p:blipFill>
+        <p:spPr>
+          <a:xfrm>
+            <a:off x="6830907" y="2551549"/>
+            <a:ext cx="1756408" cy="1915092"/>
+          </a:xfrm>
+          <a:prstGeom prst="rect">
+            <a:avLst/>
+          </a:prstGeom>
+        </p:spPr>
+      </p:pic>
+    </p:spTree>
+    <p:extLst>
+      <p:ext uri="{BB962C8B-B14F-4D97-AF65-F5344CB8AC3E}">
+        <p14:creationId xmlns:p14="http://schemas.microsoft.com/office/powerpoint/2010/main" val="1389008769"/>
+      </p:ext>
+    </p:extLst>
+  </p:cSld>
+  <p:clrMapOvr>
+    <a:masterClrMapping/>
+  </p:clrMapOvr>
+</p:sld>
+</file>
+
+<file path=ppt/slides/slide9.xml><?xml version="1.0" encoding="utf-8"?>
+<p:sld xmlns:a="http://schemas.openxmlformats.org/drawingml/2006/main" xmlns:r="http://schemas.openxmlformats.org/officeDocument/2006/relationships" xmlns:p="http://schemas.openxmlformats.org/presentationml/2006/main">
+  <p:cSld>
+    <p:spTree>
+      <p:nvGrpSpPr>
+        <p:cNvPr id="1" name=""/>
+        <p:cNvGrpSpPr/>
+        <p:nvPr/>
+      </p:nvGrpSpPr>
+      <p:grpSpPr>
+        <a:xfrm>
+          <a:off x="0" y="0"/>
+          <a:ext cx="0" cy="0"/>
+          <a:chOff x="0" y="0"/>
+          <a:chExt cx="0" cy="0"/>
+        </a:xfrm>
+      </p:grpSpPr>
+      <p:sp>
+        <p:nvSpPr>
+          <p:cNvPr id="2" name="Title 1"/>
+          <p:cNvSpPr>
+            <a:spLocks noGrp="1"/>
+          </p:cNvSpPr>
+          <p:nvPr>
+            <p:ph type="title"/>
+          </p:nvPr>
+        </p:nvSpPr>
+        <p:spPr/>
+        <p:txBody>
+          <a:bodyPr/>
+          <a:lstStyle/>
+          <a:p>
+            <a:r>
+              <a:rPr lang="en-US" dirty="0" smtClean="0"/>
+              <a:t>Goals of the Club</a:t>
             </a:r>
             <a:endParaRPr lang="en-US" dirty="0"/>
           </a:p>
@@ -5977,10 +6637,127 @@
         </p:nvSpPr>
         <p:spPr/>
         <p:txBody>
-          <a:bodyPr/>
-          <a:lstStyle/>
-          <a:p>
-            <a:endParaRPr lang="en-US"/>
+          <a:bodyPr>
+            <a:normAutofit fontScale="92500" lnSpcReduction="20000"/>
+          </a:bodyPr>
+          <a:lstStyle/>
+          <a:p>
+            <a:r>
+              <a:rPr lang="en-US" dirty="0" smtClean="0"/>
+              <a:t>Initially focusing on syntax and procedural language.</a:t>
+            </a:r>
+          </a:p>
+          <a:p>
+            <a:pPr lvl="1"/>
+            <a:r>
+              <a:rPr lang="en-US" dirty="0" smtClean="0"/>
+              <a:t>Milestone to make a tested script that can be called from command line</a:t>
+            </a:r>
+            <a:r>
+              <a:rPr lang="en-US" dirty="0" smtClean="0"/>
+              <a:t>.</a:t>
+            </a:r>
+          </a:p>
+          <a:p>
+            <a:r>
+              <a:rPr lang="en-US" dirty="0" smtClean="0"/>
+              <a:t>Good Programming Practices and Agile Development in Science</a:t>
+            </a:r>
+          </a:p>
+          <a:p>
+            <a:pPr lvl="1"/>
+            <a:r>
+              <a:rPr lang="en-US" dirty="0" err="1" smtClean="0"/>
+              <a:t>Github</a:t>
+            </a:r>
+            <a:r>
+              <a:rPr lang="en-US" dirty="0" smtClean="0"/>
+              <a:t> Repo with continuous integration.</a:t>
+            </a:r>
+            <a:endParaRPr lang="en-US" dirty="0" smtClean="0"/>
+          </a:p>
+          <a:p>
+            <a:r>
+              <a:rPr lang="en-US" dirty="0" smtClean="0"/>
+              <a:t>Object Oriented Language Elements</a:t>
+            </a:r>
+          </a:p>
+          <a:p>
+            <a:pPr lvl="1"/>
+            <a:r>
+              <a:rPr lang="en-US" dirty="0" smtClean="0"/>
+              <a:t>Create a website with </a:t>
+            </a:r>
+            <a:r>
+              <a:rPr lang="en-US" dirty="0" err="1" smtClean="0"/>
+              <a:t>Django</a:t>
+            </a:r>
+            <a:r>
+              <a:rPr lang="en-US" dirty="0" smtClean="0"/>
+              <a:t> Flask?</a:t>
+            </a:r>
+          </a:p>
+          <a:p>
+            <a:pPr lvl="1"/>
+            <a:r>
+              <a:rPr lang="en-US" dirty="0" err="1" smtClean="0"/>
+              <a:t>Trinotate</a:t>
+            </a:r>
+            <a:r>
+              <a:rPr lang="en-US" dirty="0" smtClean="0"/>
+              <a:t> Web</a:t>
+            </a:r>
+            <a:r>
+              <a:rPr lang="en-US" dirty="0" smtClean="0"/>
+              <a:t>?</a:t>
+            </a:r>
+          </a:p>
+          <a:p>
+            <a:pPr lvl="1"/>
+            <a:r>
+              <a:rPr lang="en-US" dirty="0" err="1" smtClean="0"/>
+              <a:t>BioPython</a:t>
+            </a:r>
+            <a:r>
+              <a:rPr lang="en-US" dirty="0" smtClean="0"/>
+              <a:t>?</a:t>
+            </a:r>
+            <a:endParaRPr lang="en-US" dirty="0" smtClean="0"/>
+          </a:p>
+          <a:p>
+            <a:r>
+              <a:rPr lang="en-US" dirty="0" smtClean="0"/>
+              <a:t>Functional Programming</a:t>
+            </a:r>
+          </a:p>
+          <a:p>
+            <a:pPr lvl="1"/>
+            <a:r>
+              <a:rPr lang="en-US" dirty="0" smtClean="0"/>
+              <a:t>Milestone?</a:t>
+            </a:r>
+          </a:p>
+          <a:p>
+            <a:r>
+              <a:rPr lang="en-US" dirty="0" smtClean="0"/>
+              <a:t>Data Science</a:t>
+            </a:r>
+          </a:p>
+          <a:p>
+            <a:pPr lvl="1"/>
+            <a:r>
+              <a:rPr lang="en-US" dirty="0" smtClean="0"/>
+              <a:t>Milestone? </a:t>
+            </a:r>
+            <a:r>
+              <a:rPr lang="en-US" dirty="0" err="1" smtClean="0"/>
+              <a:t>iPython</a:t>
+            </a:r>
+            <a:r>
+              <a:rPr lang="en-US" dirty="0" smtClean="0"/>
+              <a:t> Notebook</a:t>
+            </a:r>
+            <a:endParaRPr lang="en-US" dirty="0"/>
           </a:p>
         </p:txBody>
       </p:sp>

</xml_diff>

<commit_message>
Updates for presentation during meeting.
</commit_message>
<xml_diff>
--- a/presentations/01_python_club_intro.pptx
+++ b/presentations/01_python_club_intro.pptx
@@ -4444,6 +4444,13 @@
   <p:clrMapOvr>
     <a:masterClrMapping/>
   </p:clrMapOvr>
+  <p:timing>
+    <p:tnLst>
+      <p:par>
+        <p:cTn xmlns:p14="http://schemas.microsoft.com/office/powerpoint/2010/main" id="1" dur="indefinite" restart="never" nodeType="tmRoot"/>
+      </p:par>
+    </p:tnLst>
+  </p:timing>
 </p:sld>
 </file>
 
@@ -4589,7 +4596,6 @@
               <a:rPr lang="en-US" dirty="0" smtClean="0"/>
               <a:t>Online user support with minimal effort</a:t>
             </a:r>
-            <a:endParaRPr lang="en-US" dirty="0" smtClean="0"/>
           </a:p>
           <a:p>
             <a:r>
@@ -4699,6 +4705,13 @@
   <p:clrMapOvr>
     <a:masterClrMapping/>
   </p:clrMapOvr>
+  <p:timing>
+    <p:tnLst>
+      <p:par>
+        <p:cTn xmlns:p14="http://schemas.microsoft.com/office/powerpoint/2010/main" id="1" dur="indefinite" restart="never" nodeType="tmRoot"/>
+      </p:par>
+    </p:tnLst>
+  </p:timing>
 </p:sld>
 </file>
 
@@ -4833,6 +4846,13 @@
   <p:clrMapOvr>
     <a:masterClrMapping/>
   </p:clrMapOvr>
+  <p:timing>
+    <p:tnLst>
+      <p:par>
+        <p:cTn xmlns:p14="http://schemas.microsoft.com/office/powerpoint/2010/main" id="1" dur="indefinite" restart="never" nodeType="tmRoot"/>
+      </p:par>
+    </p:tnLst>
+  </p:timing>
 </p:sld>
 </file>
 
@@ -4917,13 +4937,8 @@
           <a:p>
             <a:r>
               <a:rPr lang="en-US" dirty="0" smtClean="0"/>
-              <a:t>Integrated Development </a:t>
-            </a:r>
-            <a:r>
-              <a:rPr lang="en-US" dirty="0" smtClean="0"/>
-              <a:t>Environment.</a:t>
-            </a:r>
-            <a:endParaRPr lang="en-US" dirty="0" smtClean="0"/>
+              <a:t>Integrated Development Environment.</a:t>
+            </a:r>
           </a:p>
           <a:p>
             <a:pPr lvl="1"/>
@@ -4951,11 +4966,7 @@
             <a:pPr lvl="2"/>
             <a:r>
               <a:rPr lang="en-US" dirty="0" smtClean="0"/>
-              <a:t>Can get syntax highlighting and other goodies also</a:t>
-            </a:r>
-            <a:r>
-              <a:rPr lang="en-US" dirty="0" smtClean="0"/>
-              <a:t>.</a:t>
+              <a:t>Can get syntax highlighting and other goodies also.</a:t>
             </a:r>
           </a:p>
           <a:p>
@@ -4986,6 +4997,17 @@
             </a:r>
           </a:p>
           <a:p>
+            <a:pPr lvl="1"/>
+            <a:r>
+              <a:rPr lang="en-US" dirty="0" err="1" smtClean="0"/>
+              <a:t>Cousera</a:t>
+            </a:r>
+            <a:r>
+              <a:rPr lang="en-US" dirty="0" smtClean="0"/>
+              <a:t>, code-academy</a:t>
+            </a:r>
+          </a:p>
+          <a:p>
             <a:r>
               <a:rPr lang="en-US" dirty="0"/>
               <a:t>S</a:t>
@@ -4993,6 +5015,13 @@
             <a:r>
               <a:rPr lang="en-US" dirty="0" smtClean="0"/>
               <a:t>lack channel</a:t>
+            </a:r>
+          </a:p>
+          <a:p>
+            <a:pPr lvl="1"/>
+            <a:r>
+              <a:rPr lang="en-US" dirty="0" err="1" smtClean="0"/>
+              <a:t>neumann@broadinstitute.org</a:t>
             </a:r>
             <a:endParaRPr lang="en-US" dirty="0"/>
           </a:p>
@@ -5028,6 +5057,13 @@
   <p:clrMapOvr>
     <a:masterClrMapping/>
   </p:clrMapOvr>
+  <p:timing>
+    <p:tnLst>
+      <p:par>
+        <p:cTn xmlns:p14="http://schemas.microsoft.com/office/powerpoint/2010/main" id="1" dur="indefinite" restart="never" nodeType="tmRoot"/>
+      </p:par>
+    </p:tnLst>
+  </p:timing>
 </p:sld>
 </file>
 
@@ -5199,6 +5235,13 @@
   <p:clrMapOvr>
     <a:masterClrMapping/>
   </p:clrMapOvr>
+  <p:timing>
+    <p:tnLst>
+      <p:par>
+        <p:cTn xmlns:p14="http://schemas.microsoft.com/office/powerpoint/2010/main" id="1" dur="indefinite" restart="never" nodeType="tmRoot"/>
+      </p:par>
+    </p:tnLst>
+  </p:timing>
 </p:sld>
 </file>
 
@@ -5285,7 +5328,7 @@
           <a:p>
             <a:r>
               <a:rPr lang="en-US" dirty="0" smtClean="0"/>
-              <a:t>Meet once a week</a:t>
+              <a:t>Meet once every 2 weeks</a:t>
             </a:r>
           </a:p>
           <a:p>
@@ -5438,6 +5481,13 @@
   <p:clrMapOvr>
     <a:masterClrMapping/>
   </p:clrMapOvr>
+  <p:timing>
+    <p:tnLst>
+      <p:par>
+        <p:cTn xmlns:p14="http://schemas.microsoft.com/office/powerpoint/2010/main" id="1" dur="indefinite" restart="never" nodeType="tmRoot"/>
+      </p:par>
+    </p:tnLst>
+  </p:timing>
 </p:sld>
 </file>
 
@@ -5594,7 +5644,6 @@
               <a:rPr lang="en-US" sz="2400" dirty="0" smtClean="0"/>
               <a:t>This is not a tyranny!</a:t>
             </a:r>
-            <a:endParaRPr lang="en-US" sz="2400" dirty="0" smtClean="0"/>
           </a:p>
           <a:p>
             <a:pPr lvl="1"/>
@@ -5660,6 +5709,13 @@
   <p:clrMapOvr>
     <a:masterClrMapping/>
   </p:clrMapOvr>
+  <p:timing>
+    <p:tnLst>
+      <p:par>
+        <p:cTn xmlns:p14="http://schemas.microsoft.com/office/powerpoint/2010/main" id="1" dur="indefinite" restart="never" nodeType="tmRoot"/>
+      </p:par>
+    </p:tnLst>
+  </p:timing>
 </p:sld>
 </file>
 
@@ -5782,7 +5838,6 @@
               <a:rPr lang="en-US" dirty="0" smtClean="0"/>
               <a:t>Perl is not as readable and is becoming less embraced in the community.</a:t>
             </a:r>
-            <a:endParaRPr lang="en-US" dirty="0" smtClean="0"/>
           </a:p>
           <a:p>
             <a:r>
@@ -5854,6 +5909,13 @@
   <p:clrMapOvr>
     <a:masterClrMapping/>
   </p:clrMapOvr>
+  <p:timing>
+    <p:tnLst>
+      <p:par>
+        <p:cTn xmlns:p14="http://schemas.microsoft.com/office/powerpoint/2010/main" id="1" dur="indefinite" restart="never" nodeType="tmRoot"/>
+      </p:par>
+    </p:tnLst>
+  </p:timing>
 </p:sld>
 </file>
 
@@ -6095,6 +6157,13 @@
   <p:clrMapOvr>
     <a:masterClrMapping/>
   </p:clrMapOvr>
+  <p:timing>
+    <p:tnLst>
+      <p:par>
+        <p:cTn xmlns:p14="http://schemas.microsoft.com/office/powerpoint/2010/main" id="1" dur="indefinite" restart="never" nodeType="tmRoot"/>
+      </p:par>
+    </p:tnLst>
+  </p:timing>
 </p:sld>
 </file>
 
@@ -6330,6 +6399,13 @@
   <p:clrMapOvr>
     <a:masterClrMapping/>
   </p:clrMapOvr>
+  <p:timing>
+    <p:tnLst>
+      <p:par>
+        <p:cTn xmlns:p14="http://schemas.microsoft.com/office/powerpoint/2010/main" id="1" dur="indefinite" restart="never" nodeType="tmRoot"/>
+      </p:par>
+    </p:tnLst>
+  </p:timing>
 </p:sld>
 </file>
 
@@ -6558,6 +6634,13 @@
   <p:clrMapOvr>
     <a:masterClrMapping/>
   </p:clrMapOvr>
+  <p:timing>
+    <p:tnLst>
+      <p:par>
+        <p:cTn xmlns:p14="http://schemas.microsoft.com/office/powerpoint/2010/main" id="1" dur="indefinite" restart="never" nodeType="tmRoot"/>
+      </p:par>
+    </p:tnLst>
+  </p:timing>
 </p:sld>
 </file>
 
@@ -6651,11 +6734,7 @@
             <a:pPr lvl="1"/>
             <a:r>
               <a:rPr lang="en-US" dirty="0" smtClean="0"/>
-              <a:t>Milestone to make a tested script that can be called from command line</a:t>
-            </a:r>
-            <a:r>
-              <a:rPr lang="en-US" dirty="0" smtClean="0"/>
-              <a:t>.</a:t>
+              <a:t>Milestone to make a tested script that can be called from command line.</a:t>
             </a:r>
           </a:p>
           <a:p>
@@ -6674,7 +6753,6 @@
               <a:rPr lang="en-US" dirty="0" smtClean="0"/>
               <a:t> Repo with continuous integration.</a:t>
             </a:r>
-            <a:endParaRPr lang="en-US" dirty="0" smtClean="0"/>
           </a:p>
           <a:p>
             <a:r>
@@ -6705,11 +6783,7 @@
             </a:r>
             <a:r>
               <a:rPr lang="en-US" dirty="0" smtClean="0"/>
-              <a:t> Web</a:t>
-            </a:r>
-            <a:r>
-              <a:rPr lang="en-US" dirty="0" smtClean="0"/>
-              <a:t>?</a:t>
+              <a:t> Web?</a:t>
             </a:r>
           </a:p>
           <a:p>
@@ -6722,7 +6796,6 @@
               <a:rPr lang="en-US" dirty="0" smtClean="0"/>
               <a:t>?</a:t>
             </a:r>
-            <a:endParaRPr lang="en-US" dirty="0" smtClean="0"/>
           </a:p>
           <a:p>
             <a:r>
@@ -6791,6 +6864,13 @@
   <p:clrMapOvr>
     <a:masterClrMapping/>
   </p:clrMapOvr>
+  <p:timing>
+    <p:tnLst>
+      <p:par>
+        <p:cTn xmlns:p14="http://schemas.microsoft.com/office/powerpoint/2010/main" id="1" dur="indefinite" restart="never" nodeType="tmRoot"/>
+      </p:par>
+    </p:tnLst>
+  </p:timing>
 </p:sld>
 </file>
 

</xml_diff>